<commit_message>
docs : zookeepers 화면설계도.pptx 수정건
</commit_message>
<xml_diff>
--- a/zookeepers 화면설계서.pptx
+++ b/zookeepers 화면설계서.pptx
@@ -5,23 +5,24 @@
     <p:sldMasterId id="2147483648" r:id="rId1"/>
   </p:sldMasterIdLst>
   <p:notesMasterIdLst>
-    <p:notesMasterId r:id="rId13"/>
+    <p:notesMasterId r:id="rId14"/>
   </p:notesMasterIdLst>
   <p:handoutMasterIdLst>
-    <p:handoutMasterId r:id="rId14"/>
+    <p:handoutMasterId r:id="rId15"/>
   </p:handoutMasterIdLst>
   <p:sldIdLst>
     <p:sldId id="256" r:id="rId2"/>
     <p:sldId id="265" r:id="rId3"/>
     <p:sldId id="276" r:id="rId4"/>
-    <p:sldId id="274" r:id="rId5"/>
-    <p:sldId id="278" r:id="rId6"/>
-    <p:sldId id="279" r:id="rId7"/>
-    <p:sldId id="280" r:id="rId8"/>
-    <p:sldId id="281" r:id="rId9"/>
-    <p:sldId id="282" r:id="rId10"/>
-    <p:sldId id="283" r:id="rId11"/>
-    <p:sldId id="284" r:id="rId12"/>
+    <p:sldId id="285" r:id="rId5"/>
+    <p:sldId id="274" r:id="rId6"/>
+    <p:sldId id="278" r:id="rId7"/>
+    <p:sldId id="279" r:id="rId8"/>
+    <p:sldId id="280" r:id="rId9"/>
+    <p:sldId id="281" r:id="rId10"/>
+    <p:sldId id="282" r:id="rId11"/>
+    <p:sldId id="283" r:id="rId12"/>
+    <p:sldId id="284" r:id="rId13"/>
   </p:sldIdLst>
   <p:sldSz cx="12192000" cy="6858000"/>
   <p:notesSz cx="6797675" cy="9926638"/>
@@ -132,6 +133,7 @@
           <p14:sldIdLst>
             <p14:sldId id="265"/>
             <p14:sldId id="276"/>
+            <p14:sldId id="285"/>
             <p14:sldId id="274"/>
             <p14:sldId id="278"/>
             <p14:sldId id="279"/>
@@ -364,7 +366,7 @@
           <a:p>
             <a:fld id="{98FBB39A-9110-43FD-8DF2-684D1523A0BC}" type="datetime1">
               <a:rPr lang="ko-KR" altLang="en-US" smtClean="0"/>
-              <a:t>2022-11-08</a:t>
+              <a:t>2022-11-10</a:t>
             </a:fld>
             <a:endParaRPr lang="ko-KR" altLang="en-US"/>
           </a:p>
@@ -1384,7 +1386,7 @@
           </a:ln>
           <a:extLst>
             <a:ext uri="{C572A759-6A51-4108-AA02-DFA0A04FC94B}">
-              <ma14:wrappingTextBoxFlag xmlns="" xmlns:m="http://schemas.openxmlformats.org/officeDocument/2006/math" xmlns:a14="http://schemas.microsoft.com/office/drawing/2010/main" xmlns:ma14="http://schemas.microsoft.com/office/mac/drawingml/2011/main" val="1"/>
+              <ma14:wrappingTextBoxFlag xmlns:ma14="http://schemas.microsoft.com/office/mac/drawingml/2011/main" xmlns:a14="http://schemas.microsoft.com/office/drawing/2010/main" xmlns:m="http://schemas.openxmlformats.org/officeDocument/2006/math" xmlns="" val="1"/>
             </a:ext>
           </a:extLst>
         </p:spPr>
@@ -1487,7 +1489,7 @@
           </a:ln>
           <a:extLst>
             <a:ext uri="{C572A759-6A51-4108-AA02-DFA0A04FC94B}">
-              <ma14:wrappingTextBoxFlag xmlns="" xmlns:m="http://schemas.openxmlformats.org/officeDocument/2006/math" xmlns:a14="http://schemas.microsoft.com/office/drawing/2010/main" xmlns:ma14="http://schemas.microsoft.com/office/mac/drawingml/2011/main" val="1"/>
+              <ma14:wrappingTextBoxFlag xmlns:ma14="http://schemas.microsoft.com/office/mac/drawingml/2011/main" xmlns:a14="http://schemas.microsoft.com/office/drawing/2010/main" xmlns:m="http://schemas.openxmlformats.org/officeDocument/2006/math" xmlns="" val="1"/>
             </a:ext>
           </a:extLst>
         </p:spPr>
@@ -1589,7 +1591,7 @@
           </a:ln>
           <a:extLst>
             <a:ext uri="{C572A759-6A51-4108-AA02-DFA0A04FC94B}">
-              <ma14:wrappingTextBoxFlag xmlns="" xmlns:m="http://schemas.openxmlformats.org/officeDocument/2006/math" xmlns:a14="http://schemas.microsoft.com/office/drawing/2010/main" xmlns:ma14="http://schemas.microsoft.com/office/mac/drawingml/2011/main" val="1"/>
+              <ma14:wrappingTextBoxFlag xmlns:ma14="http://schemas.microsoft.com/office/mac/drawingml/2011/main" xmlns:a14="http://schemas.microsoft.com/office/drawing/2010/main" xmlns:m="http://schemas.openxmlformats.org/officeDocument/2006/math" xmlns="" val="1"/>
             </a:ext>
           </a:extLst>
         </p:spPr>
@@ -3337,6 +3339,1834 @@
           <a:lstStyle/>
           <a:p>
             <a:r>
+              <a:rPr lang="en-US" altLang="ko-KR" dirty="0"/>
+              <a:t>TRADEBOARD</a:t>
+            </a:r>
+            <a:endParaRPr lang="ko-KR" altLang="en-US" dirty="0"/>
+          </a:p>
+        </p:txBody>
+      </p:sp>
+      <p:sp>
+        <p:nvSpPr>
+          <p:cNvPr id="5" name="텍스트 개체 틀 4">
+            <a:extLst>
+              <a:ext uri="{FF2B5EF4-FFF2-40B4-BE49-F238E27FC236}">
+                <a16:creationId xmlns:a16="http://schemas.microsoft.com/office/drawing/2014/main" id="{181CE6EC-43A5-4409-9C12-1C3782E8CB22}"/>
+              </a:ext>
+            </a:extLst>
+          </p:cNvPr>
+          <p:cNvSpPr>
+            <a:spLocks noGrp="1"/>
+          </p:cNvSpPr>
+          <p:nvPr>
+            <p:ph type="body" sz="quarter" idx="11"/>
+          </p:nvPr>
+        </p:nvSpPr>
+        <p:spPr/>
+        <p:txBody>
+          <a:bodyPr/>
+          <a:lstStyle/>
+          <a:p>
+            <a:endParaRPr lang="en-US" altLang="ko-KR" dirty="0"/>
+          </a:p>
+          <a:p>
+            <a:r>
+              <a:rPr lang="en-US" altLang="ko-KR" dirty="0"/>
+              <a:t>zookeepers</a:t>
+            </a:r>
+            <a:endParaRPr lang="ko-KR" altLang="en-US" dirty="0"/>
+          </a:p>
+          <a:p>
+            <a:endParaRPr lang="ko-KR" altLang="en-US" dirty="0"/>
+          </a:p>
+        </p:txBody>
+      </p:sp>
+      <p:graphicFrame>
+        <p:nvGraphicFramePr>
+          <p:cNvPr id="7" name="표 6">
+            <a:extLst>
+              <a:ext uri="{FF2B5EF4-FFF2-40B4-BE49-F238E27FC236}">
+                <a16:creationId xmlns:a16="http://schemas.microsoft.com/office/drawing/2014/main" id="{EE672C9C-2796-4CD4-B138-FB14ECB9EFA6}"/>
+              </a:ext>
+            </a:extLst>
+          </p:cNvPr>
+          <p:cNvGraphicFramePr>
+            <a:graphicFrameLocks noGrp="1"/>
+          </p:cNvGraphicFramePr>
+          <p:nvPr>
+            <p:extLst>
+              <p:ext uri="{D42A27DB-BD31-4B8C-83A1-F6EECF244321}">
+                <p14:modId xmlns:p14="http://schemas.microsoft.com/office/powerpoint/2010/main" val="346107679"/>
+              </p:ext>
+            </p:extLst>
+          </p:nvPr>
+        </p:nvGraphicFramePr>
+        <p:xfrm>
+          <a:off x="8688288" y="476672"/>
+          <a:ext cx="3384376" cy="2817704"/>
+        </p:xfrm>
+        <a:graphic>
+          <a:graphicData uri="http://schemas.openxmlformats.org/drawingml/2006/table">
+            <a:tbl>
+              <a:tblPr firstRow="1" bandRow="1">
+                <a:tableStyleId>{5C22544A-7EE6-4342-B048-85BDC9FD1C3A}</a:tableStyleId>
+              </a:tblPr>
+              <a:tblGrid>
+                <a:gridCol w="403256">
+                  <a:extLst>
+                    <a:ext uri="{9D8B030D-6E8A-4147-A177-3AD203B41FA5}">
+                      <a16:colId xmlns:a16="http://schemas.microsoft.com/office/drawing/2014/main" val="74772085"/>
+                    </a:ext>
+                  </a:extLst>
+                </a:gridCol>
+                <a:gridCol w="2981120">
+                  <a:extLst>
+                    <a:ext uri="{9D8B030D-6E8A-4147-A177-3AD203B41FA5}">
+                      <a16:colId xmlns:a16="http://schemas.microsoft.com/office/drawing/2014/main" val="2572474025"/>
+                    </a:ext>
+                  </a:extLst>
+                </a:gridCol>
+              </a:tblGrid>
+              <a:tr h="258850">
+                <a:tc gridSpan="2">
+                  <a:txBody>
+                    <a:bodyPr/>
+                    <a:lstStyle/>
+                    <a:p>
+                      <a:pPr marL="0" marR="0" lvl="0" indent="0" algn="l" defTabSz="914400" rtl="0" eaLnBrk="1" fontAlgn="auto" latinLnBrk="1" hangingPunct="1">
+                        <a:lnSpc>
+                          <a:spcPct val="100000"/>
+                        </a:lnSpc>
+                        <a:spcBef>
+                          <a:spcPts val="0"/>
+                        </a:spcBef>
+                        <a:spcAft>
+                          <a:spcPts val="0"/>
+                        </a:spcAft>
+                        <a:buClrTx/>
+                        <a:buSzTx/>
+                        <a:buFontTx/>
+                        <a:buNone/>
+                        <a:tabLst/>
+                        <a:defRPr/>
+                      </a:pPr>
+                      <a:r>
+                        <a:rPr lang="en-US" altLang="ko-KR" sz="900" b="1" dirty="0">
+                          <a:solidFill>
+                            <a:srgbClr val="4E5263"/>
+                          </a:solidFill>
+                          <a:latin typeface="+mn-ea"/>
+                          <a:ea typeface="+mn-ea"/>
+                          <a:sym typeface="맑은 고딕"/>
+                        </a:rPr>
+                        <a:t>Summery.</a:t>
+                      </a:r>
+                      <a:endParaRPr lang="en" altLang="ko-KR" sz="900" b="1" dirty="0">
+                        <a:solidFill>
+                          <a:srgbClr val="4E5263"/>
+                        </a:solidFill>
+                        <a:latin typeface="+mn-ea"/>
+                        <a:ea typeface="+mn-ea"/>
+                        <a:sym typeface="맑은 고딕"/>
+                      </a:endParaRPr>
+                    </a:p>
+                  </a:txBody>
+                  <a:tcPr anchor="ctr">
+                    <a:lnL w="3175" cap="flat" cmpd="sng" algn="ctr">
+                      <a:noFill/>
+                      <a:prstDash val="solid"/>
+                      <a:round/>
+                      <a:headEnd type="none" w="med" len="med"/>
+                      <a:tailEnd type="none" w="med" len="med"/>
+                    </a:lnL>
+                    <a:lnR w="3175" cap="flat" cmpd="sng" algn="ctr">
+                      <a:noFill/>
+                      <a:prstDash val="solid"/>
+                      <a:round/>
+                      <a:headEnd type="none" w="med" len="med"/>
+                      <a:tailEnd type="none" w="med" len="med"/>
+                    </a:lnR>
+                    <a:lnT w="3175" cap="flat" cmpd="sng" algn="ctr">
+                      <a:noFill/>
+                      <a:prstDash val="solid"/>
+                      <a:round/>
+                      <a:headEnd type="none" w="med" len="med"/>
+                      <a:tailEnd type="none" w="med" len="med"/>
+                    </a:lnT>
+                    <a:lnB w="3175" cap="flat" cmpd="sng" algn="ctr">
+                      <a:solidFill>
+                        <a:schemeClr val="bg1">
+                          <a:lumMod val="65000"/>
+                        </a:schemeClr>
+                      </a:solidFill>
+                      <a:prstDash val="solid"/>
+                      <a:round/>
+                      <a:headEnd type="none" w="med" len="med"/>
+                      <a:tailEnd type="none" w="med" len="med"/>
+                    </a:lnB>
+                    <a:solidFill>
+                      <a:schemeClr val="bg1"/>
+                    </a:solidFill>
+                  </a:tcPr>
+                </a:tc>
+                <a:tc hMerge="1">
+                  <a:txBody>
+                    <a:bodyPr/>
+                    <a:lstStyle/>
+                    <a:p>
+                      <a:pPr marL="0" marR="0" lvl="0" indent="0" algn="l" defTabSz="914400" rtl="0" eaLnBrk="1" fontAlgn="auto" latinLnBrk="1" hangingPunct="1">
+                        <a:lnSpc>
+                          <a:spcPct val="100000"/>
+                        </a:lnSpc>
+                        <a:spcBef>
+                          <a:spcPts val="0"/>
+                        </a:spcBef>
+                        <a:spcAft>
+                          <a:spcPts val="0"/>
+                        </a:spcAft>
+                        <a:buClrTx/>
+                        <a:buSzTx/>
+                        <a:buFontTx/>
+                        <a:buNone/>
+                        <a:tabLst/>
+                        <a:defRPr/>
+                      </a:pPr>
+                      <a:endParaRPr lang="en" altLang="ko-KR" sz="900" b="1" dirty="0">
+                        <a:solidFill>
+                          <a:srgbClr val="4E5263"/>
+                        </a:solidFill>
+                        <a:latin typeface="SF Pro Text" pitchFamily="2" charset="0"/>
+                        <a:ea typeface="SF Pro Text" pitchFamily="2" charset="0"/>
+                        <a:sym typeface="맑은 고딕"/>
+                      </a:endParaRPr>
+                    </a:p>
+                  </a:txBody>
+                  <a:tcPr anchor="ctr">
+                    <a:lnL w="3175" cap="flat" cmpd="sng" algn="ctr">
+                      <a:solidFill>
+                        <a:schemeClr val="tx1">
+                          <a:lumMod val="50000"/>
+                          <a:lumOff val="50000"/>
+                        </a:schemeClr>
+                      </a:solidFill>
+                      <a:prstDash val="solid"/>
+                      <a:round/>
+                      <a:headEnd type="none" w="med" len="med"/>
+                      <a:tailEnd type="none" w="med" len="med"/>
+                    </a:lnL>
+                    <a:lnR w="3175" cap="flat" cmpd="sng" algn="ctr">
+                      <a:noFill/>
+                      <a:prstDash val="solid"/>
+                      <a:round/>
+                      <a:headEnd type="none" w="med" len="med"/>
+                      <a:tailEnd type="none" w="med" len="med"/>
+                    </a:lnR>
+                    <a:lnT w="3175" cap="flat" cmpd="sng" algn="ctr">
+                      <a:noFill/>
+                      <a:prstDash val="solid"/>
+                      <a:round/>
+                      <a:headEnd type="none" w="med" len="med"/>
+                      <a:tailEnd type="none" w="med" len="med"/>
+                    </a:lnT>
+                    <a:lnB w="3175" cap="flat" cmpd="sng" algn="ctr">
+                      <a:solidFill>
+                        <a:schemeClr val="tx1">
+                          <a:lumMod val="50000"/>
+                          <a:lumOff val="50000"/>
+                        </a:schemeClr>
+                      </a:solidFill>
+                      <a:prstDash val="solid"/>
+                      <a:round/>
+                      <a:headEnd type="none" w="med" len="med"/>
+                      <a:tailEnd type="none" w="med" len="med"/>
+                    </a:lnB>
+                    <a:noFill/>
+                  </a:tcPr>
+                </a:tc>
+                <a:extLst>
+                  <a:ext uri="{0D108BD9-81ED-4DB2-BD59-A6C34878D82A}">
+                    <a16:rowId xmlns:a16="http://schemas.microsoft.com/office/drawing/2014/main" val="1283880267"/>
+                  </a:ext>
+                </a:extLst>
+              </a:tr>
+              <a:tr h="786307">
+                <a:tc gridSpan="2">
+                  <a:txBody>
+                    <a:bodyPr/>
+                    <a:lstStyle/>
+                    <a:p>
+                      <a:pPr marL="108000" marR="0" lvl="0" indent="-108000" algn="just" defTabSz="914400" rtl="0" eaLnBrk="1" fontAlgn="auto" latinLnBrk="1" hangingPunct="1">
+                        <a:lnSpc>
+                          <a:spcPct val="120000"/>
+                        </a:lnSpc>
+                        <a:spcBef>
+                          <a:spcPts val="0"/>
+                        </a:spcBef>
+                        <a:spcAft>
+                          <a:spcPts val="0"/>
+                        </a:spcAft>
+                        <a:buClrTx/>
+                        <a:buSzTx/>
+                        <a:buFont typeface="Arial" panose="020B0604020202020204" pitchFamily="34" charset="0"/>
+                        <a:buChar char="•"/>
+                        <a:tabLst/>
+                        <a:defRPr/>
+                      </a:pPr>
+                      <a:r>
+                        <a:rPr lang="ko-KR" altLang="en-US" sz="800" b="0" dirty="0">
+                          <a:solidFill>
+                            <a:schemeClr val="tx1"/>
+                          </a:solidFill>
+                          <a:latin typeface="+mn-ea"/>
+                          <a:ea typeface="+mn-ea"/>
+                          <a:sym typeface="맑은 고딕"/>
+                        </a:rPr>
+                        <a:t>게시글 </a:t>
+                      </a:r>
+                      <a:r>
+                        <a:rPr lang="ko-KR" altLang="en-US" sz="800" b="0" dirty="0" err="1">
+                          <a:solidFill>
+                            <a:schemeClr val="tx1"/>
+                          </a:solidFill>
+                          <a:latin typeface="+mn-ea"/>
+                          <a:ea typeface="+mn-ea"/>
+                          <a:sym typeface="맑은 고딕"/>
+                        </a:rPr>
+                        <a:t>페이징처리</a:t>
+                      </a:r>
+                      <a:r>
+                        <a:rPr lang="en-US" altLang="ko-KR" sz="800" b="0" dirty="0">
+                          <a:solidFill>
+                            <a:schemeClr val="tx1"/>
+                          </a:solidFill>
+                          <a:latin typeface="+mn-ea"/>
+                          <a:ea typeface="+mn-ea"/>
+                          <a:sym typeface="맑은 고딕"/>
+                        </a:rPr>
+                        <a:t>, </a:t>
+                      </a:r>
+                      <a:r>
+                        <a:rPr lang="ko-KR" altLang="en-US" sz="800" b="0" dirty="0">
+                          <a:solidFill>
+                            <a:schemeClr val="tx1"/>
+                          </a:solidFill>
+                          <a:latin typeface="+mn-ea"/>
+                          <a:ea typeface="+mn-ea"/>
+                          <a:sym typeface="맑은 고딕"/>
+                        </a:rPr>
+                        <a:t>카테고리 별 </a:t>
+                      </a:r>
+                      <a:r>
+                        <a:rPr lang="ko-KR" altLang="en-US" sz="800" b="0" dirty="0" err="1">
+                          <a:solidFill>
+                            <a:schemeClr val="tx1"/>
+                          </a:solidFill>
+                          <a:latin typeface="+mn-ea"/>
+                          <a:ea typeface="+mn-ea"/>
+                          <a:sym typeface="맑은 고딕"/>
+                        </a:rPr>
+                        <a:t>판매글</a:t>
+                      </a:r>
+                      <a:r>
+                        <a:rPr lang="ko-KR" altLang="en-US" sz="800" b="0" dirty="0">
+                          <a:solidFill>
+                            <a:schemeClr val="tx1"/>
+                          </a:solidFill>
+                          <a:latin typeface="+mn-ea"/>
+                          <a:ea typeface="+mn-ea"/>
+                          <a:sym typeface="맑은 고딕"/>
+                        </a:rPr>
+                        <a:t> 목록</a:t>
+                      </a:r>
+                      <a:r>
+                        <a:rPr lang="en-US" altLang="ko-KR" sz="800" b="0" dirty="0">
+                          <a:solidFill>
+                            <a:schemeClr val="tx1"/>
+                          </a:solidFill>
+                          <a:latin typeface="+mn-ea"/>
+                          <a:ea typeface="+mn-ea"/>
+                          <a:sym typeface="맑은 고딕"/>
+                        </a:rPr>
+                        <a:t>, </a:t>
+                      </a:r>
+                      <a:r>
+                        <a:rPr lang="ko-KR" altLang="en-US" sz="800" b="0" dirty="0" err="1">
+                          <a:solidFill>
+                            <a:schemeClr val="tx1"/>
+                          </a:solidFill>
+                          <a:latin typeface="+mn-ea"/>
+                          <a:ea typeface="+mn-ea"/>
+                          <a:sym typeface="맑은 고딕"/>
+                        </a:rPr>
+                        <a:t>판매글</a:t>
+                      </a:r>
+                      <a:r>
+                        <a:rPr lang="ko-KR" altLang="en-US" sz="800" b="0" dirty="0">
+                          <a:solidFill>
+                            <a:schemeClr val="tx1"/>
+                          </a:solidFill>
+                          <a:latin typeface="+mn-ea"/>
+                          <a:ea typeface="+mn-ea"/>
+                          <a:sym typeface="맑은 고딕"/>
+                        </a:rPr>
+                        <a:t> 검색 구현</a:t>
+                      </a:r>
+                      <a:endParaRPr lang="en-US" altLang="ko-KR" sz="800" b="0" dirty="0">
+                        <a:solidFill>
+                          <a:schemeClr val="tx1"/>
+                        </a:solidFill>
+                        <a:latin typeface="+mn-ea"/>
+                        <a:ea typeface="+mn-ea"/>
+                        <a:sym typeface="맑은 고딕"/>
+                      </a:endParaRPr>
+                    </a:p>
+                    <a:p>
+                      <a:pPr marL="108000" marR="0" lvl="0" indent="-108000" algn="just" defTabSz="914400" rtl="0" eaLnBrk="1" fontAlgn="auto" latinLnBrk="1" hangingPunct="1">
+                        <a:lnSpc>
+                          <a:spcPct val="120000"/>
+                        </a:lnSpc>
+                        <a:spcBef>
+                          <a:spcPts val="0"/>
+                        </a:spcBef>
+                        <a:spcAft>
+                          <a:spcPts val="0"/>
+                        </a:spcAft>
+                        <a:buClrTx/>
+                        <a:buSzTx/>
+                        <a:buFont typeface="Arial" panose="020B0604020202020204" pitchFamily="34" charset="0"/>
+                        <a:buChar char="•"/>
+                        <a:tabLst/>
+                        <a:defRPr/>
+                      </a:pPr>
+                      <a:r>
+                        <a:rPr lang="ko-KR" altLang="en-US" sz="800" b="0" dirty="0">
+                          <a:solidFill>
+                            <a:schemeClr val="tx1"/>
+                          </a:solidFill>
+                          <a:latin typeface="+mn-ea"/>
+                          <a:ea typeface="+mn-ea"/>
+                          <a:sym typeface="맑은 고딕"/>
+                        </a:rPr>
+                        <a:t>게시글 별 타이틀</a:t>
+                      </a:r>
+                      <a:r>
+                        <a:rPr lang="en-US" altLang="ko-KR" sz="800" b="0" dirty="0">
+                          <a:solidFill>
+                            <a:schemeClr val="tx1"/>
+                          </a:solidFill>
+                          <a:latin typeface="+mn-ea"/>
+                          <a:ea typeface="+mn-ea"/>
+                          <a:sym typeface="맑은 고딕"/>
+                        </a:rPr>
+                        <a:t>, </a:t>
+                      </a:r>
+                      <a:r>
+                        <a:rPr lang="ko-KR" altLang="en-US" sz="800" b="0" dirty="0">
+                          <a:solidFill>
+                            <a:schemeClr val="tx1"/>
+                          </a:solidFill>
+                          <a:latin typeface="+mn-ea"/>
+                          <a:ea typeface="+mn-ea"/>
+                          <a:sym typeface="맑은 고딕"/>
+                        </a:rPr>
+                        <a:t>가격</a:t>
+                      </a:r>
+                      <a:r>
+                        <a:rPr lang="en-US" altLang="ko-KR" sz="800" b="0" dirty="0">
+                          <a:solidFill>
+                            <a:schemeClr val="tx1"/>
+                          </a:solidFill>
+                          <a:latin typeface="+mn-ea"/>
+                          <a:ea typeface="+mn-ea"/>
+                          <a:sym typeface="맑은 고딕"/>
+                        </a:rPr>
+                        <a:t>, </a:t>
+                      </a:r>
+                      <a:r>
+                        <a:rPr lang="ko-KR" altLang="en-US" sz="800" b="0" dirty="0">
+                          <a:solidFill>
+                            <a:schemeClr val="tx1"/>
+                          </a:solidFill>
+                          <a:latin typeface="+mn-ea"/>
+                          <a:ea typeface="+mn-ea"/>
+                          <a:sym typeface="맑은 고딕"/>
+                        </a:rPr>
+                        <a:t>판매상태</a:t>
+                      </a:r>
+                      <a:r>
+                        <a:rPr lang="en-US" altLang="ko-KR" sz="800" b="0" dirty="0">
+                          <a:solidFill>
+                            <a:schemeClr val="tx1"/>
+                          </a:solidFill>
+                          <a:latin typeface="+mn-ea"/>
+                          <a:ea typeface="+mn-ea"/>
+                          <a:sym typeface="맑은 고딕"/>
+                        </a:rPr>
+                        <a:t>, </a:t>
+                      </a:r>
+                      <a:r>
+                        <a:rPr lang="ko-KR" altLang="en-US" sz="800" b="0" dirty="0">
+                          <a:solidFill>
+                            <a:schemeClr val="tx1"/>
+                          </a:solidFill>
+                          <a:latin typeface="+mn-ea"/>
+                          <a:ea typeface="+mn-ea"/>
+                          <a:sym typeface="맑은 고딕"/>
+                        </a:rPr>
+                        <a:t>작성자 표출</a:t>
+                      </a:r>
+                      <a:endParaRPr lang="en-US" altLang="ko-KR" sz="800" b="0" dirty="0">
+                        <a:solidFill>
+                          <a:schemeClr val="tx1"/>
+                        </a:solidFill>
+                        <a:latin typeface="+mn-ea"/>
+                        <a:ea typeface="+mn-ea"/>
+                        <a:sym typeface="맑은 고딕"/>
+                      </a:endParaRPr>
+                    </a:p>
+                  </a:txBody>
+                  <a:tcPr anchor="ctr">
+                    <a:lnL w="3175" cap="flat" cmpd="sng" algn="ctr">
+                      <a:noFill/>
+                      <a:prstDash val="solid"/>
+                      <a:round/>
+                      <a:headEnd type="none" w="med" len="med"/>
+                      <a:tailEnd type="none" w="med" len="med"/>
+                    </a:lnL>
+                    <a:lnR w="3175" cap="flat" cmpd="sng" algn="ctr">
+                      <a:noFill/>
+                      <a:prstDash val="solid"/>
+                      <a:round/>
+                      <a:headEnd type="none" w="med" len="med"/>
+                      <a:tailEnd type="none" w="med" len="med"/>
+                    </a:lnR>
+                    <a:lnT w="3175" cap="flat" cmpd="sng" algn="ctr">
+                      <a:solidFill>
+                        <a:schemeClr val="bg1">
+                          <a:lumMod val="65000"/>
+                        </a:schemeClr>
+                      </a:solidFill>
+                      <a:prstDash val="solid"/>
+                      <a:round/>
+                      <a:headEnd type="none" w="med" len="med"/>
+                      <a:tailEnd type="none" w="med" len="med"/>
+                    </a:lnT>
+                    <a:lnB w="3175" cap="flat" cmpd="sng" algn="ctr">
+                      <a:solidFill>
+                        <a:schemeClr val="tx1">
+                          <a:lumMod val="50000"/>
+                          <a:lumOff val="50000"/>
+                        </a:schemeClr>
+                      </a:solidFill>
+                      <a:prstDash val="solid"/>
+                      <a:round/>
+                      <a:headEnd type="none" w="med" len="med"/>
+                      <a:tailEnd type="none" w="med" len="med"/>
+                    </a:lnB>
+                    <a:noFill/>
+                  </a:tcPr>
+                </a:tc>
+                <a:tc hMerge="1">
+                  <a:txBody>
+                    <a:bodyPr/>
+                    <a:lstStyle/>
+                    <a:p>
+                      <a:pPr latinLnBrk="1"/>
+                      <a:endParaRPr lang="ko-KR" altLang="en-US"/>
+                    </a:p>
+                  </a:txBody>
+                  <a:tcPr/>
+                </a:tc>
+                <a:extLst>
+                  <a:ext uri="{0D108BD9-81ED-4DB2-BD59-A6C34878D82A}">
+                    <a16:rowId xmlns:a16="http://schemas.microsoft.com/office/drawing/2014/main" val="3072083066"/>
+                  </a:ext>
+                </a:extLst>
+              </a:tr>
+              <a:tr h="322995">
+                <a:tc>
+                  <a:txBody>
+                    <a:bodyPr/>
+                    <a:lstStyle/>
+                    <a:p>
+                      <a:pPr algn="ctr" latinLnBrk="1">
+                        <a:lnSpc>
+                          <a:spcPct val="120000"/>
+                        </a:lnSpc>
+                      </a:pPr>
+                      <a:r>
+                        <a:rPr lang="en-US" altLang="ko-KR" sz="850" b="0" dirty="0">
+                          <a:solidFill>
+                            <a:schemeClr val="tx1"/>
+                          </a:solidFill>
+                          <a:latin typeface="+mn-ea"/>
+                          <a:ea typeface="+mn-ea"/>
+                        </a:rPr>
+                        <a:t>1</a:t>
+                      </a:r>
+                      <a:endParaRPr lang="ko-KR" altLang="en-US" sz="850" b="0" dirty="0">
+                        <a:solidFill>
+                          <a:schemeClr val="tx1"/>
+                        </a:solidFill>
+                        <a:latin typeface="+mn-ea"/>
+                        <a:ea typeface="+mn-ea"/>
+                      </a:endParaRPr>
+                    </a:p>
+                  </a:txBody>
+                  <a:tcPr anchor="ctr">
+                    <a:lnL w="3175" cap="flat" cmpd="sng" algn="ctr">
+                      <a:noFill/>
+                      <a:prstDash val="solid"/>
+                      <a:round/>
+                      <a:headEnd type="none" w="med" len="med"/>
+                      <a:tailEnd type="none" w="med" len="med"/>
+                    </a:lnL>
+                    <a:lnR w="3175" cap="flat" cmpd="sng" algn="ctr">
+                      <a:solidFill>
+                        <a:schemeClr val="tx1">
+                          <a:lumMod val="50000"/>
+                          <a:lumOff val="50000"/>
+                        </a:schemeClr>
+                      </a:solidFill>
+                      <a:prstDash val="solid"/>
+                      <a:round/>
+                      <a:headEnd type="none" w="med" len="med"/>
+                      <a:tailEnd type="none" w="med" len="med"/>
+                    </a:lnR>
+                    <a:lnT w="3175" cap="flat" cmpd="sng" algn="ctr">
+                      <a:solidFill>
+                        <a:schemeClr val="tx1">
+                          <a:lumMod val="50000"/>
+                          <a:lumOff val="50000"/>
+                        </a:schemeClr>
+                      </a:solidFill>
+                      <a:prstDash val="solid"/>
+                      <a:round/>
+                      <a:headEnd type="none" w="med" len="med"/>
+                      <a:tailEnd type="none" w="med" len="med"/>
+                    </a:lnT>
+                    <a:lnB w="3175" cap="flat" cmpd="sng" algn="ctr">
+                      <a:solidFill>
+                        <a:schemeClr val="tx1">
+                          <a:lumMod val="50000"/>
+                          <a:lumOff val="50000"/>
+                        </a:schemeClr>
+                      </a:solidFill>
+                      <a:prstDash val="solid"/>
+                      <a:round/>
+                      <a:headEnd type="none" w="med" len="med"/>
+                      <a:tailEnd type="none" w="med" len="med"/>
+                    </a:lnB>
+                    <a:noFill/>
+                  </a:tcPr>
+                </a:tc>
+                <a:tc>
+                  <a:txBody>
+                    <a:bodyPr/>
+                    <a:lstStyle/>
+                    <a:p>
+                      <a:pPr algn="just" latinLnBrk="1">
+                        <a:lnSpc>
+                          <a:spcPct val="120000"/>
+                        </a:lnSpc>
+                      </a:pPr>
+                      <a:r>
+                        <a:rPr lang="en-US" altLang="ko-KR" sz="850" b="0" dirty="0">
+                          <a:latin typeface="+mn-ea"/>
+                          <a:ea typeface="+mn-ea"/>
+                        </a:rPr>
+                        <a:t>Nav bar</a:t>
+                      </a:r>
+                      <a:endParaRPr lang="ko-KR" altLang="en-US" sz="850" b="0" dirty="0">
+                        <a:latin typeface="+mn-ea"/>
+                        <a:ea typeface="+mn-ea"/>
+                      </a:endParaRPr>
+                    </a:p>
+                  </a:txBody>
+                  <a:tcPr anchor="ctr">
+                    <a:lnL w="3175" cap="flat" cmpd="sng" algn="ctr">
+                      <a:solidFill>
+                        <a:schemeClr val="tx1">
+                          <a:lumMod val="50000"/>
+                          <a:lumOff val="50000"/>
+                        </a:schemeClr>
+                      </a:solidFill>
+                      <a:prstDash val="solid"/>
+                      <a:round/>
+                      <a:headEnd type="none" w="med" len="med"/>
+                      <a:tailEnd type="none" w="med" len="med"/>
+                    </a:lnL>
+                    <a:lnR w="3175" cap="flat" cmpd="sng" algn="ctr">
+                      <a:noFill/>
+                      <a:prstDash val="solid"/>
+                      <a:round/>
+                      <a:headEnd type="none" w="med" len="med"/>
+                      <a:tailEnd type="none" w="med" len="med"/>
+                    </a:lnR>
+                    <a:lnT w="3175" cap="flat" cmpd="sng" algn="ctr">
+                      <a:solidFill>
+                        <a:schemeClr val="tx1">
+                          <a:lumMod val="50000"/>
+                          <a:lumOff val="50000"/>
+                        </a:schemeClr>
+                      </a:solidFill>
+                      <a:prstDash val="solid"/>
+                      <a:round/>
+                      <a:headEnd type="none" w="med" len="med"/>
+                      <a:tailEnd type="none" w="med" len="med"/>
+                    </a:lnT>
+                    <a:lnB w="3175" cap="flat" cmpd="sng" algn="ctr">
+                      <a:solidFill>
+                        <a:schemeClr val="tx1">
+                          <a:lumMod val="50000"/>
+                          <a:lumOff val="50000"/>
+                        </a:schemeClr>
+                      </a:solidFill>
+                      <a:prstDash val="solid"/>
+                      <a:round/>
+                      <a:headEnd type="none" w="med" len="med"/>
+                      <a:tailEnd type="none" w="med" len="med"/>
+                    </a:lnB>
+                    <a:noFill/>
+                  </a:tcPr>
+                </a:tc>
+                <a:extLst>
+                  <a:ext uri="{0D108BD9-81ED-4DB2-BD59-A6C34878D82A}">
+                    <a16:rowId xmlns:a16="http://schemas.microsoft.com/office/drawing/2014/main" val="896699591"/>
+                  </a:ext>
+                </a:extLst>
+              </a:tr>
+              <a:tr h="241592">
+                <a:tc>
+                  <a:txBody>
+                    <a:bodyPr/>
+                    <a:lstStyle/>
+                    <a:p>
+                      <a:pPr algn="ctr" latinLnBrk="1">
+                        <a:lnSpc>
+                          <a:spcPct val="120000"/>
+                        </a:lnSpc>
+                      </a:pPr>
+                      <a:r>
+                        <a:rPr lang="en-US" altLang="ko-KR" sz="850" b="0" dirty="0">
+                          <a:latin typeface="+mn-ea"/>
+                          <a:ea typeface="+mn-ea"/>
+                        </a:rPr>
+                        <a:t>2</a:t>
+                      </a:r>
+                      <a:endParaRPr lang="ko-KR" altLang="en-US" sz="850" b="0" dirty="0">
+                        <a:latin typeface="+mn-ea"/>
+                        <a:ea typeface="+mn-ea"/>
+                      </a:endParaRPr>
+                    </a:p>
+                  </a:txBody>
+                  <a:tcPr anchor="ctr">
+                    <a:lnL w="3175" cap="flat" cmpd="sng" algn="ctr">
+                      <a:noFill/>
+                      <a:prstDash val="solid"/>
+                      <a:round/>
+                      <a:headEnd type="none" w="med" len="med"/>
+                      <a:tailEnd type="none" w="med" len="med"/>
+                    </a:lnL>
+                    <a:lnR w="3175" cap="flat" cmpd="sng" algn="ctr">
+                      <a:solidFill>
+                        <a:schemeClr val="tx1">
+                          <a:lumMod val="50000"/>
+                          <a:lumOff val="50000"/>
+                        </a:schemeClr>
+                      </a:solidFill>
+                      <a:prstDash val="solid"/>
+                      <a:round/>
+                      <a:headEnd type="none" w="med" len="med"/>
+                      <a:tailEnd type="none" w="med" len="med"/>
+                    </a:lnR>
+                    <a:lnT w="3175" cap="flat" cmpd="sng" algn="ctr">
+                      <a:solidFill>
+                        <a:schemeClr val="tx1">
+                          <a:lumMod val="50000"/>
+                          <a:lumOff val="50000"/>
+                        </a:schemeClr>
+                      </a:solidFill>
+                      <a:prstDash val="solid"/>
+                      <a:round/>
+                      <a:headEnd type="none" w="med" len="med"/>
+                      <a:tailEnd type="none" w="med" len="med"/>
+                    </a:lnT>
+                    <a:lnB w="3175" cap="flat" cmpd="sng" algn="ctr">
+                      <a:solidFill>
+                        <a:schemeClr val="tx1">
+                          <a:lumMod val="50000"/>
+                          <a:lumOff val="50000"/>
+                        </a:schemeClr>
+                      </a:solidFill>
+                      <a:prstDash val="solid"/>
+                      <a:round/>
+                      <a:headEnd type="none" w="med" len="med"/>
+                      <a:tailEnd type="none" w="med" len="med"/>
+                    </a:lnB>
+                    <a:noFill/>
+                  </a:tcPr>
+                </a:tc>
+                <a:tc>
+                  <a:txBody>
+                    <a:bodyPr/>
+                    <a:lstStyle/>
+                    <a:p>
+                      <a:pPr marL="0" marR="0" lvl="0" indent="0" algn="just" defTabSz="914400" rtl="0" eaLnBrk="1" fontAlgn="auto" latinLnBrk="1" hangingPunct="1">
+                        <a:lnSpc>
+                          <a:spcPct val="120000"/>
+                        </a:lnSpc>
+                        <a:spcBef>
+                          <a:spcPts val="0"/>
+                        </a:spcBef>
+                        <a:spcAft>
+                          <a:spcPts val="0"/>
+                        </a:spcAft>
+                        <a:buClrTx/>
+                        <a:buSzTx/>
+                        <a:buFontTx/>
+                        <a:buNone/>
+                        <a:tabLst/>
+                        <a:defRPr/>
+                      </a:pPr>
+                      <a:r>
+                        <a:rPr kumimoji="1" lang="ko-KR" altLang="en-US" sz="850" dirty="0" err="1">
+                          <a:solidFill>
+                            <a:schemeClr val="tx1"/>
+                          </a:solidFill>
+                          <a:latin typeface="+mn-ea"/>
+                        </a:rPr>
+                        <a:t>판매글</a:t>
+                      </a:r>
+                      <a:r>
+                        <a:rPr kumimoji="1" lang="ko-KR" altLang="en-US" sz="850" dirty="0">
+                          <a:solidFill>
+                            <a:schemeClr val="tx1"/>
+                          </a:solidFill>
+                          <a:latin typeface="+mn-ea"/>
+                        </a:rPr>
+                        <a:t> 목록 </a:t>
+                      </a:r>
+                      <a:r>
+                        <a:rPr kumimoji="1" lang="en-US" altLang="ko-KR" sz="850" dirty="0">
+                          <a:solidFill>
+                            <a:schemeClr val="tx1"/>
+                          </a:solidFill>
+                          <a:latin typeface="+mn-ea"/>
+                        </a:rPr>
+                        <a:t>(title, price, </a:t>
+                      </a:r>
+                      <a:r>
+                        <a:rPr kumimoji="1" lang="en-US" altLang="ko-KR" sz="850" dirty="0" err="1">
+                          <a:solidFill>
+                            <a:schemeClr val="tx1"/>
+                          </a:solidFill>
+                          <a:latin typeface="+mn-ea"/>
+                        </a:rPr>
+                        <a:t>statuss</a:t>
+                      </a:r>
+                      <a:r>
+                        <a:rPr kumimoji="1" lang="en-US" altLang="ko-KR" sz="850" dirty="0">
+                          <a:solidFill>
+                            <a:schemeClr val="tx1"/>
+                          </a:solidFill>
+                          <a:latin typeface="+mn-ea"/>
+                        </a:rPr>
+                        <a:t>, writer)</a:t>
+                      </a:r>
+                      <a:endParaRPr kumimoji="1" lang="ko-KR" altLang="en-US" sz="850" dirty="0">
+                        <a:solidFill>
+                          <a:schemeClr val="tx1"/>
+                        </a:solidFill>
+                        <a:latin typeface="+mn-ea"/>
+                      </a:endParaRPr>
+                    </a:p>
+                  </a:txBody>
+                  <a:tcPr anchor="ctr">
+                    <a:lnL w="3175" cap="flat" cmpd="sng" algn="ctr">
+                      <a:solidFill>
+                        <a:schemeClr val="tx1">
+                          <a:lumMod val="50000"/>
+                          <a:lumOff val="50000"/>
+                        </a:schemeClr>
+                      </a:solidFill>
+                      <a:prstDash val="solid"/>
+                      <a:round/>
+                      <a:headEnd type="none" w="med" len="med"/>
+                      <a:tailEnd type="none" w="med" len="med"/>
+                    </a:lnL>
+                    <a:lnR w="3175" cap="flat" cmpd="sng" algn="ctr">
+                      <a:noFill/>
+                      <a:prstDash val="solid"/>
+                      <a:round/>
+                      <a:headEnd type="none" w="med" len="med"/>
+                      <a:tailEnd type="none" w="med" len="med"/>
+                    </a:lnR>
+                    <a:lnT w="3175" cap="flat" cmpd="sng" algn="ctr">
+                      <a:solidFill>
+                        <a:schemeClr val="tx1">
+                          <a:lumMod val="50000"/>
+                          <a:lumOff val="50000"/>
+                        </a:schemeClr>
+                      </a:solidFill>
+                      <a:prstDash val="solid"/>
+                      <a:round/>
+                      <a:headEnd type="none" w="med" len="med"/>
+                      <a:tailEnd type="none" w="med" len="med"/>
+                    </a:lnT>
+                    <a:lnB w="3175" cap="flat" cmpd="sng" algn="ctr">
+                      <a:solidFill>
+                        <a:schemeClr val="tx1">
+                          <a:lumMod val="50000"/>
+                          <a:lumOff val="50000"/>
+                        </a:schemeClr>
+                      </a:solidFill>
+                      <a:prstDash val="solid"/>
+                      <a:round/>
+                      <a:headEnd type="none" w="med" len="med"/>
+                      <a:tailEnd type="none" w="med" len="med"/>
+                    </a:lnB>
+                    <a:noFill/>
+                  </a:tcPr>
+                </a:tc>
+                <a:extLst>
+                  <a:ext uri="{0D108BD9-81ED-4DB2-BD59-A6C34878D82A}">
+                    <a16:rowId xmlns:a16="http://schemas.microsoft.com/office/drawing/2014/main" val="2972133637"/>
+                  </a:ext>
+                </a:extLst>
+              </a:tr>
+              <a:tr h="241592">
+                <a:tc>
+                  <a:txBody>
+                    <a:bodyPr/>
+                    <a:lstStyle/>
+                    <a:p>
+                      <a:pPr algn="ctr" latinLnBrk="1">
+                        <a:lnSpc>
+                          <a:spcPct val="120000"/>
+                        </a:lnSpc>
+                      </a:pPr>
+                      <a:r>
+                        <a:rPr lang="en-US" altLang="ko-KR" sz="850" b="0" dirty="0">
+                          <a:latin typeface="+mn-ea"/>
+                          <a:ea typeface="+mn-ea"/>
+                        </a:rPr>
+                        <a:t>3</a:t>
+                      </a:r>
+                      <a:endParaRPr lang="ko-KR" altLang="en-US" sz="850" b="0" dirty="0">
+                        <a:latin typeface="+mn-ea"/>
+                        <a:ea typeface="+mn-ea"/>
+                      </a:endParaRPr>
+                    </a:p>
+                  </a:txBody>
+                  <a:tcPr anchor="ctr">
+                    <a:lnL w="3175" cap="flat" cmpd="sng" algn="ctr">
+                      <a:noFill/>
+                      <a:prstDash val="solid"/>
+                      <a:round/>
+                      <a:headEnd type="none" w="med" len="med"/>
+                      <a:tailEnd type="none" w="med" len="med"/>
+                    </a:lnL>
+                    <a:lnR w="3175" cap="flat" cmpd="sng" algn="ctr">
+                      <a:solidFill>
+                        <a:schemeClr val="tx1">
+                          <a:lumMod val="50000"/>
+                          <a:lumOff val="50000"/>
+                        </a:schemeClr>
+                      </a:solidFill>
+                      <a:prstDash val="solid"/>
+                      <a:round/>
+                      <a:headEnd type="none" w="med" len="med"/>
+                      <a:tailEnd type="none" w="med" len="med"/>
+                    </a:lnR>
+                    <a:lnT w="3175" cap="flat" cmpd="sng" algn="ctr">
+                      <a:solidFill>
+                        <a:schemeClr val="tx1">
+                          <a:lumMod val="50000"/>
+                          <a:lumOff val="50000"/>
+                        </a:schemeClr>
+                      </a:solidFill>
+                      <a:prstDash val="solid"/>
+                      <a:round/>
+                      <a:headEnd type="none" w="med" len="med"/>
+                      <a:tailEnd type="none" w="med" len="med"/>
+                    </a:lnT>
+                    <a:lnB w="3175" cap="flat" cmpd="sng" algn="ctr">
+                      <a:solidFill>
+                        <a:schemeClr val="tx1">
+                          <a:lumMod val="50000"/>
+                          <a:lumOff val="50000"/>
+                        </a:schemeClr>
+                      </a:solidFill>
+                      <a:prstDash val="solid"/>
+                      <a:round/>
+                      <a:headEnd type="none" w="med" len="med"/>
+                      <a:tailEnd type="none" w="med" len="med"/>
+                    </a:lnB>
+                    <a:noFill/>
+                  </a:tcPr>
+                </a:tc>
+                <a:tc>
+                  <a:txBody>
+                    <a:bodyPr/>
+                    <a:lstStyle/>
+                    <a:p>
+                      <a:pPr marL="0" marR="0" lvl="0" indent="0" algn="just" defTabSz="914400" rtl="0" eaLnBrk="1" fontAlgn="auto" latinLnBrk="1" hangingPunct="1">
+                        <a:lnSpc>
+                          <a:spcPct val="120000"/>
+                        </a:lnSpc>
+                        <a:spcBef>
+                          <a:spcPts val="0"/>
+                        </a:spcBef>
+                        <a:spcAft>
+                          <a:spcPts val="0"/>
+                        </a:spcAft>
+                        <a:buClrTx/>
+                        <a:buSzTx/>
+                        <a:buFontTx/>
+                        <a:buNone/>
+                        <a:tabLst/>
+                        <a:defRPr/>
+                      </a:pPr>
+                      <a:r>
+                        <a:rPr kumimoji="1" lang="ko-KR" altLang="en-US" sz="850" dirty="0">
+                          <a:solidFill>
+                            <a:schemeClr val="tx1"/>
+                          </a:solidFill>
+                          <a:latin typeface="+mn-ea"/>
+                        </a:rPr>
+                        <a:t>카테고리 선택에 따른 게시글 필터 처리</a:t>
+                      </a:r>
+                    </a:p>
+                  </a:txBody>
+                  <a:tcPr anchor="ctr">
+                    <a:lnL w="3175" cap="flat" cmpd="sng" algn="ctr">
+                      <a:solidFill>
+                        <a:schemeClr val="tx1">
+                          <a:lumMod val="50000"/>
+                          <a:lumOff val="50000"/>
+                        </a:schemeClr>
+                      </a:solidFill>
+                      <a:prstDash val="solid"/>
+                      <a:round/>
+                      <a:headEnd type="none" w="med" len="med"/>
+                      <a:tailEnd type="none" w="med" len="med"/>
+                    </a:lnL>
+                    <a:lnR w="3175" cap="flat" cmpd="sng" algn="ctr">
+                      <a:noFill/>
+                      <a:prstDash val="solid"/>
+                      <a:round/>
+                      <a:headEnd type="none" w="med" len="med"/>
+                      <a:tailEnd type="none" w="med" len="med"/>
+                    </a:lnR>
+                    <a:lnT w="3175" cap="flat" cmpd="sng" algn="ctr">
+                      <a:solidFill>
+                        <a:schemeClr val="tx1">
+                          <a:lumMod val="50000"/>
+                          <a:lumOff val="50000"/>
+                        </a:schemeClr>
+                      </a:solidFill>
+                      <a:prstDash val="solid"/>
+                      <a:round/>
+                      <a:headEnd type="none" w="med" len="med"/>
+                      <a:tailEnd type="none" w="med" len="med"/>
+                    </a:lnT>
+                    <a:lnB w="3175" cap="flat" cmpd="sng" algn="ctr">
+                      <a:solidFill>
+                        <a:schemeClr val="tx1">
+                          <a:lumMod val="50000"/>
+                          <a:lumOff val="50000"/>
+                        </a:schemeClr>
+                      </a:solidFill>
+                      <a:prstDash val="solid"/>
+                      <a:round/>
+                      <a:headEnd type="none" w="med" len="med"/>
+                      <a:tailEnd type="none" w="med" len="med"/>
+                    </a:lnB>
+                    <a:noFill/>
+                  </a:tcPr>
+                </a:tc>
+                <a:extLst>
+                  <a:ext uri="{0D108BD9-81ED-4DB2-BD59-A6C34878D82A}">
+                    <a16:rowId xmlns:a16="http://schemas.microsoft.com/office/drawing/2014/main" val="2075783758"/>
+                  </a:ext>
+                </a:extLst>
+              </a:tr>
+              <a:tr h="241592">
+                <a:tc>
+                  <a:txBody>
+                    <a:bodyPr/>
+                    <a:lstStyle/>
+                    <a:p>
+                      <a:pPr algn="ctr" latinLnBrk="1">
+                        <a:lnSpc>
+                          <a:spcPct val="120000"/>
+                        </a:lnSpc>
+                      </a:pPr>
+                      <a:r>
+                        <a:rPr lang="en-US" altLang="ko-KR" sz="850" b="0" dirty="0">
+                          <a:latin typeface="+mn-ea"/>
+                          <a:ea typeface="+mn-ea"/>
+                        </a:rPr>
+                        <a:t>4</a:t>
+                      </a:r>
+                      <a:endParaRPr lang="ko-KR" altLang="en-US" sz="850" b="0" dirty="0">
+                        <a:latin typeface="+mn-ea"/>
+                        <a:ea typeface="+mn-ea"/>
+                      </a:endParaRPr>
+                    </a:p>
+                  </a:txBody>
+                  <a:tcPr anchor="ctr">
+                    <a:lnL w="3175" cap="flat" cmpd="sng" algn="ctr">
+                      <a:noFill/>
+                      <a:prstDash val="solid"/>
+                      <a:round/>
+                      <a:headEnd type="none" w="med" len="med"/>
+                      <a:tailEnd type="none" w="med" len="med"/>
+                    </a:lnL>
+                    <a:lnR w="3175" cap="flat" cmpd="sng" algn="ctr">
+                      <a:solidFill>
+                        <a:schemeClr val="tx1">
+                          <a:lumMod val="50000"/>
+                          <a:lumOff val="50000"/>
+                        </a:schemeClr>
+                      </a:solidFill>
+                      <a:prstDash val="solid"/>
+                      <a:round/>
+                      <a:headEnd type="none" w="med" len="med"/>
+                      <a:tailEnd type="none" w="med" len="med"/>
+                    </a:lnR>
+                    <a:lnT w="3175" cap="flat" cmpd="sng" algn="ctr">
+                      <a:solidFill>
+                        <a:schemeClr val="tx1">
+                          <a:lumMod val="50000"/>
+                          <a:lumOff val="50000"/>
+                        </a:schemeClr>
+                      </a:solidFill>
+                      <a:prstDash val="solid"/>
+                      <a:round/>
+                      <a:headEnd type="none" w="med" len="med"/>
+                      <a:tailEnd type="none" w="med" len="med"/>
+                    </a:lnT>
+                    <a:lnB w="3175" cap="flat" cmpd="sng" algn="ctr">
+                      <a:solidFill>
+                        <a:schemeClr val="tx1">
+                          <a:lumMod val="50000"/>
+                          <a:lumOff val="50000"/>
+                        </a:schemeClr>
+                      </a:solidFill>
+                      <a:prstDash val="solid"/>
+                      <a:round/>
+                      <a:headEnd type="none" w="med" len="med"/>
+                      <a:tailEnd type="none" w="med" len="med"/>
+                    </a:lnB>
+                    <a:noFill/>
+                  </a:tcPr>
+                </a:tc>
+                <a:tc>
+                  <a:txBody>
+                    <a:bodyPr/>
+                    <a:lstStyle/>
+                    <a:p>
+                      <a:pPr marL="0" marR="0" lvl="0" indent="0" algn="just" defTabSz="914400" rtl="0" eaLnBrk="1" fontAlgn="auto" latinLnBrk="1" hangingPunct="1">
+                        <a:lnSpc>
+                          <a:spcPct val="120000"/>
+                        </a:lnSpc>
+                        <a:spcBef>
+                          <a:spcPts val="0"/>
+                        </a:spcBef>
+                        <a:spcAft>
+                          <a:spcPts val="0"/>
+                        </a:spcAft>
+                        <a:buClrTx/>
+                        <a:buSzTx/>
+                        <a:buFontTx/>
+                        <a:buNone/>
+                        <a:tabLst/>
+                        <a:defRPr/>
+                      </a:pPr>
+                      <a:r>
+                        <a:rPr kumimoji="1" lang="ko-KR" altLang="en-US" sz="850" dirty="0">
+                          <a:solidFill>
+                            <a:schemeClr val="tx1"/>
+                          </a:solidFill>
+                          <a:latin typeface="+mn-ea"/>
+                        </a:rPr>
+                        <a:t>게시글 목록 </a:t>
+                      </a:r>
+                      <a:r>
+                        <a:rPr kumimoji="1" lang="en-US" altLang="ko-KR" sz="850" dirty="0">
+                          <a:solidFill>
+                            <a:schemeClr val="tx1"/>
+                          </a:solidFill>
+                          <a:latin typeface="+mn-ea"/>
+                        </a:rPr>
+                        <a:t>10</a:t>
+                      </a:r>
+                      <a:r>
+                        <a:rPr kumimoji="1" lang="ko-KR" altLang="en-US" sz="850" dirty="0">
+                          <a:solidFill>
+                            <a:schemeClr val="tx1"/>
+                          </a:solidFill>
+                          <a:latin typeface="+mn-ea"/>
+                        </a:rPr>
+                        <a:t>개 단위로 </a:t>
+                      </a:r>
+                      <a:r>
+                        <a:rPr kumimoji="1" lang="ko-KR" altLang="en-US" sz="850" dirty="0" err="1">
+                          <a:solidFill>
+                            <a:schemeClr val="tx1"/>
+                          </a:solidFill>
+                          <a:latin typeface="+mn-ea"/>
+                        </a:rPr>
+                        <a:t>페이징</a:t>
+                      </a:r>
+                      <a:r>
+                        <a:rPr kumimoji="1" lang="ko-KR" altLang="en-US" sz="850" dirty="0">
+                          <a:solidFill>
+                            <a:schemeClr val="tx1"/>
+                          </a:solidFill>
+                          <a:latin typeface="+mn-ea"/>
+                        </a:rPr>
+                        <a:t> 처리</a:t>
+                      </a:r>
+                      <a:endParaRPr kumimoji="1" lang="en-US" altLang="ko-KR" sz="850" dirty="0">
+                        <a:solidFill>
+                          <a:schemeClr val="tx1"/>
+                        </a:solidFill>
+                        <a:latin typeface="+mn-ea"/>
+                      </a:endParaRPr>
+                    </a:p>
+                  </a:txBody>
+                  <a:tcPr anchor="ctr">
+                    <a:lnL w="3175" cap="flat" cmpd="sng" algn="ctr">
+                      <a:solidFill>
+                        <a:schemeClr val="tx1">
+                          <a:lumMod val="50000"/>
+                          <a:lumOff val="50000"/>
+                        </a:schemeClr>
+                      </a:solidFill>
+                      <a:prstDash val="solid"/>
+                      <a:round/>
+                      <a:headEnd type="none" w="med" len="med"/>
+                      <a:tailEnd type="none" w="med" len="med"/>
+                    </a:lnL>
+                    <a:lnR w="3175" cap="flat" cmpd="sng" algn="ctr">
+                      <a:noFill/>
+                      <a:prstDash val="solid"/>
+                      <a:round/>
+                      <a:headEnd type="none" w="med" len="med"/>
+                      <a:tailEnd type="none" w="med" len="med"/>
+                    </a:lnR>
+                    <a:lnT w="3175" cap="flat" cmpd="sng" algn="ctr">
+                      <a:solidFill>
+                        <a:schemeClr val="tx1">
+                          <a:lumMod val="50000"/>
+                          <a:lumOff val="50000"/>
+                        </a:schemeClr>
+                      </a:solidFill>
+                      <a:prstDash val="solid"/>
+                      <a:round/>
+                      <a:headEnd type="none" w="med" len="med"/>
+                      <a:tailEnd type="none" w="med" len="med"/>
+                    </a:lnT>
+                    <a:lnB w="3175" cap="flat" cmpd="sng" algn="ctr">
+                      <a:solidFill>
+                        <a:schemeClr val="tx1">
+                          <a:lumMod val="50000"/>
+                          <a:lumOff val="50000"/>
+                        </a:schemeClr>
+                      </a:solidFill>
+                      <a:prstDash val="solid"/>
+                      <a:round/>
+                      <a:headEnd type="none" w="med" len="med"/>
+                      <a:tailEnd type="none" w="med" len="med"/>
+                    </a:lnB>
+                    <a:noFill/>
+                  </a:tcPr>
+                </a:tc>
+                <a:extLst>
+                  <a:ext uri="{0D108BD9-81ED-4DB2-BD59-A6C34878D82A}">
+                    <a16:rowId xmlns:a16="http://schemas.microsoft.com/office/drawing/2014/main" val="1068123190"/>
+                  </a:ext>
+                </a:extLst>
+              </a:tr>
+              <a:tr h="241592">
+                <a:tc>
+                  <a:txBody>
+                    <a:bodyPr/>
+                    <a:lstStyle/>
+                    <a:p>
+                      <a:pPr algn="ctr" latinLnBrk="1">
+                        <a:lnSpc>
+                          <a:spcPct val="120000"/>
+                        </a:lnSpc>
+                      </a:pPr>
+                      <a:r>
+                        <a:rPr lang="en-US" altLang="ko-KR" sz="850" b="0" dirty="0">
+                          <a:latin typeface="+mn-ea"/>
+                          <a:ea typeface="+mn-ea"/>
+                        </a:rPr>
+                        <a:t>5</a:t>
+                      </a:r>
+                      <a:endParaRPr lang="ko-KR" altLang="en-US" sz="850" b="0" dirty="0">
+                        <a:latin typeface="+mn-ea"/>
+                        <a:ea typeface="+mn-ea"/>
+                      </a:endParaRPr>
+                    </a:p>
+                  </a:txBody>
+                  <a:tcPr anchor="ctr">
+                    <a:lnL w="3175" cap="flat" cmpd="sng" algn="ctr">
+                      <a:noFill/>
+                      <a:prstDash val="solid"/>
+                      <a:round/>
+                      <a:headEnd type="none" w="med" len="med"/>
+                      <a:tailEnd type="none" w="med" len="med"/>
+                    </a:lnL>
+                    <a:lnR w="3175" cap="flat" cmpd="sng" algn="ctr">
+                      <a:solidFill>
+                        <a:schemeClr val="tx1">
+                          <a:lumMod val="50000"/>
+                          <a:lumOff val="50000"/>
+                        </a:schemeClr>
+                      </a:solidFill>
+                      <a:prstDash val="solid"/>
+                      <a:round/>
+                      <a:headEnd type="none" w="med" len="med"/>
+                      <a:tailEnd type="none" w="med" len="med"/>
+                    </a:lnR>
+                    <a:lnT w="3175" cap="flat" cmpd="sng" algn="ctr">
+                      <a:solidFill>
+                        <a:schemeClr val="tx1">
+                          <a:lumMod val="50000"/>
+                          <a:lumOff val="50000"/>
+                        </a:schemeClr>
+                      </a:solidFill>
+                      <a:prstDash val="solid"/>
+                      <a:round/>
+                      <a:headEnd type="none" w="med" len="med"/>
+                      <a:tailEnd type="none" w="med" len="med"/>
+                    </a:lnT>
+                    <a:lnB w="3175" cap="flat" cmpd="sng" algn="ctr">
+                      <a:solidFill>
+                        <a:schemeClr val="tx1">
+                          <a:lumMod val="50000"/>
+                          <a:lumOff val="50000"/>
+                        </a:schemeClr>
+                      </a:solidFill>
+                      <a:prstDash val="solid"/>
+                      <a:round/>
+                      <a:headEnd type="none" w="med" len="med"/>
+                      <a:tailEnd type="none" w="med" len="med"/>
+                    </a:lnB>
+                    <a:noFill/>
+                  </a:tcPr>
+                </a:tc>
+                <a:tc>
+                  <a:txBody>
+                    <a:bodyPr/>
+                    <a:lstStyle/>
+                    <a:p>
+                      <a:pPr algn="just" latinLnBrk="1">
+                        <a:lnSpc>
+                          <a:spcPct val="120000"/>
+                        </a:lnSpc>
+                      </a:pPr>
+                      <a:r>
+                        <a:rPr lang="ko-KR" altLang="en-US" sz="850" b="0" dirty="0">
+                          <a:latin typeface="+mn-ea"/>
+                          <a:ea typeface="+mn-ea"/>
+                        </a:rPr>
+                        <a:t>타이틀 </a:t>
+                      </a:r>
+                      <a:r>
+                        <a:rPr lang="ko-KR" altLang="en-US" sz="850" b="0" dirty="0" err="1">
+                          <a:latin typeface="+mn-ea"/>
+                          <a:ea typeface="+mn-ea"/>
+                        </a:rPr>
+                        <a:t>검색바</a:t>
+                      </a:r>
+                      <a:endParaRPr lang="ko-KR" altLang="en-US" sz="850" b="0" dirty="0">
+                        <a:latin typeface="+mn-ea"/>
+                        <a:ea typeface="+mn-ea"/>
+                      </a:endParaRPr>
+                    </a:p>
+                  </a:txBody>
+                  <a:tcPr anchor="ctr">
+                    <a:lnL w="3175" cap="flat" cmpd="sng" algn="ctr">
+                      <a:solidFill>
+                        <a:schemeClr val="tx1">
+                          <a:lumMod val="50000"/>
+                          <a:lumOff val="50000"/>
+                        </a:schemeClr>
+                      </a:solidFill>
+                      <a:prstDash val="solid"/>
+                      <a:round/>
+                      <a:headEnd type="none" w="med" len="med"/>
+                      <a:tailEnd type="none" w="med" len="med"/>
+                    </a:lnL>
+                    <a:lnR w="3175" cap="flat" cmpd="sng" algn="ctr">
+                      <a:noFill/>
+                      <a:prstDash val="solid"/>
+                      <a:round/>
+                      <a:headEnd type="none" w="med" len="med"/>
+                      <a:tailEnd type="none" w="med" len="med"/>
+                    </a:lnR>
+                    <a:lnT w="3175" cap="flat" cmpd="sng" algn="ctr">
+                      <a:solidFill>
+                        <a:schemeClr val="tx1">
+                          <a:lumMod val="50000"/>
+                          <a:lumOff val="50000"/>
+                        </a:schemeClr>
+                      </a:solidFill>
+                      <a:prstDash val="solid"/>
+                      <a:round/>
+                      <a:headEnd type="none" w="med" len="med"/>
+                      <a:tailEnd type="none" w="med" len="med"/>
+                    </a:lnT>
+                    <a:lnB w="3175" cap="flat" cmpd="sng" algn="ctr">
+                      <a:solidFill>
+                        <a:schemeClr val="tx1">
+                          <a:lumMod val="50000"/>
+                          <a:lumOff val="50000"/>
+                        </a:schemeClr>
+                      </a:solidFill>
+                      <a:prstDash val="solid"/>
+                      <a:round/>
+                      <a:headEnd type="none" w="med" len="med"/>
+                      <a:tailEnd type="none" w="med" len="med"/>
+                    </a:lnB>
+                    <a:noFill/>
+                  </a:tcPr>
+                </a:tc>
+                <a:extLst>
+                  <a:ext uri="{0D108BD9-81ED-4DB2-BD59-A6C34878D82A}">
+                    <a16:rowId xmlns:a16="http://schemas.microsoft.com/office/drawing/2014/main" val="1494350657"/>
+                  </a:ext>
+                </a:extLst>
+              </a:tr>
+              <a:tr h="241592">
+                <a:tc>
+                  <a:txBody>
+                    <a:bodyPr/>
+                    <a:lstStyle/>
+                    <a:p>
+                      <a:pPr algn="ctr" latinLnBrk="1">
+                        <a:lnSpc>
+                          <a:spcPct val="120000"/>
+                        </a:lnSpc>
+                      </a:pPr>
+                      <a:r>
+                        <a:rPr lang="en-US" altLang="ko-KR" sz="850" b="0" dirty="0">
+                          <a:latin typeface="+mn-ea"/>
+                          <a:ea typeface="+mn-ea"/>
+                        </a:rPr>
+                        <a:t>6</a:t>
+                      </a:r>
+                      <a:endParaRPr lang="ko-KR" altLang="en-US" sz="850" b="0" dirty="0">
+                        <a:latin typeface="+mn-ea"/>
+                        <a:ea typeface="+mn-ea"/>
+                      </a:endParaRPr>
+                    </a:p>
+                  </a:txBody>
+                  <a:tcPr anchor="ctr">
+                    <a:lnL w="3175" cap="flat" cmpd="sng" algn="ctr">
+                      <a:noFill/>
+                      <a:prstDash val="solid"/>
+                      <a:round/>
+                      <a:headEnd type="none" w="med" len="med"/>
+                      <a:tailEnd type="none" w="med" len="med"/>
+                    </a:lnL>
+                    <a:lnR w="3175" cap="flat" cmpd="sng" algn="ctr">
+                      <a:solidFill>
+                        <a:schemeClr val="tx1">
+                          <a:lumMod val="50000"/>
+                          <a:lumOff val="50000"/>
+                        </a:schemeClr>
+                      </a:solidFill>
+                      <a:prstDash val="solid"/>
+                      <a:round/>
+                      <a:headEnd type="none" w="med" len="med"/>
+                      <a:tailEnd type="none" w="med" len="med"/>
+                    </a:lnR>
+                    <a:lnT w="3175" cap="flat" cmpd="sng" algn="ctr">
+                      <a:solidFill>
+                        <a:schemeClr val="tx1">
+                          <a:lumMod val="50000"/>
+                          <a:lumOff val="50000"/>
+                        </a:schemeClr>
+                      </a:solidFill>
+                      <a:prstDash val="solid"/>
+                      <a:round/>
+                      <a:headEnd type="none" w="med" len="med"/>
+                      <a:tailEnd type="none" w="med" len="med"/>
+                    </a:lnT>
+                    <a:lnB w="3175" cap="flat" cmpd="sng" algn="ctr">
+                      <a:solidFill>
+                        <a:schemeClr val="tx1">
+                          <a:lumMod val="50000"/>
+                          <a:lumOff val="50000"/>
+                        </a:schemeClr>
+                      </a:solidFill>
+                      <a:prstDash val="solid"/>
+                      <a:round/>
+                      <a:headEnd type="none" w="med" len="med"/>
+                      <a:tailEnd type="none" w="med" len="med"/>
+                    </a:lnB>
+                    <a:noFill/>
+                  </a:tcPr>
+                </a:tc>
+                <a:tc>
+                  <a:txBody>
+                    <a:bodyPr/>
+                    <a:lstStyle/>
+                    <a:p>
+                      <a:pPr marL="0" marR="0" lvl="0" indent="0" algn="just" defTabSz="914400" rtl="0" eaLnBrk="1" fontAlgn="auto" latinLnBrk="1" hangingPunct="1">
+                        <a:lnSpc>
+                          <a:spcPct val="120000"/>
+                        </a:lnSpc>
+                        <a:spcBef>
+                          <a:spcPts val="0"/>
+                        </a:spcBef>
+                        <a:spcAft>
+                          <a:spcPts val="0"/>
+                        </a:spcAft>
+                        <a:buClrTx/>
+                        <a:buSzTx/>
+                        <a:buFontTx/>
+                        <a:buNone/>
+                        <a:tabLst/>
+                        <a:defRPr/>
+                      </a:pPr>
+                      <a:endParaRPr kumimoji="1" lang="en-US" altLang="ko-KR" sz="850" dirty="0">
+                        <a:solidFill>
+                          <a:schemeClr val="tx1"/>
+                        </a:solidFill>
+                        <a:latin typeface="+mn-ea"/>
+                      </a:endParaRPr>
+                    </a:p>
+                  </a:txBody>
+                  <a:tcPr anchor="ctr">
+                    <a:lnL w="3175" cap="flat" cmpd="sng" algn="ctr">
+                      <a:solidFill>
+                        <a:schemeClr val="tx1">
+                          <a:lumMod val="50000"/>
+                          <a:lumOff val="50000"/>
+                        </a:schemeClr>
+                      </a:solidFill>
+                      <a:prstDash val="solid"/>
+                      <a:round/>
+                      <a:headEnd type="none" w="med" len="med"/>
+                      <a:tailEnd type="none" w="med" len="med"/>
+                    </a:lnL>
+                    <a:lnR w="3175" cap="flat" cmpd="sng" algn="ctr">
+                      <a:noFill/>
+                      <a:prstDash val="solid"/>
+                      <a:round/>
+                      <a:headEnd type="none" w="med" len="med"/>
+                      <a:tailEnd type="none" w="med" len="med"/>
+                    </a:lnR>
+                    <a:lnT w="3175" cap="flat" cmpd="sng" algn="ctr">
+                      <a:solidFill>
+                        <a:schemeClr val="tx1">
+                          <a:lumMod val="50000"/>
+                          <a:lumOff val="50000"/>
+                        </a:schemeClr>
+                      </a:solidFill>
+                      <a:prstDash val="solid"/>
+                      <a:round/>
+                      <a:headEnd type="none" w="med" len="med"/>
+                      <a:tailEnd type="none" w="med" len="med"/>
+                    </a:lnT>
+                    <a:lnB w="3175" cap="flat" cmpd="sng" algn="ctr">
+                      <a:solidFill>
+                        <a:schemeClr val="tx1">
+                          <a:lumMod val="50000"/>
+                          <a:lumOff val="50000"/>
+                        </a:schemeClr>
+                      </a:solidFill>
+                      <a:prstDash val="solid"/>
+                      <a:round/>
+                      <a:headEnd type="none" w="med" len="med"/>
+                      <a:tailEnd type="none" w="med" len="med"/>
+                    </a:lnB>
+                    <a:noFill/>
+                  </a:tcPr>
+                </a:tc>
+                <a:extLst>
+                  <a:ext uri="{0D108BD9-81ED-4DB2-BD59-A6C34878D82A}">
+                    <a16:rowId xmlns:a16="http://schemas.microsoft.com/office/drawing/2014/main" val="1839284551"/>
+                  </a:ext>
+                </a:extLst>
+              </a:tr>
+              <a:tr h="241592">
+                <a:tc>
+                  <a:txBody>
+                    <a:bodyPr/>
+                    <a:lstStyle/>
+                    <a:p>
+                      <a:pPr algn="ctr" latinLnBrk="1">
+                        <a:lnSpc>
+                          <a:spcPct val="120000"/>
+                        </a:lnSpc>
+                      </a:pPr>
+                      <a:r>
+                        <a:rPr lang="en-US" altLang="ko-KR" sz="850" b="0" dirty="0">
+                          <a:latin typeface="+mn-ea"/>
+                          <a:ea typeface="+mn-ea"/>
+                        </a:rPr>
+                        <a:t>7</a:t>
+                      </a:r>
+                      <a:endParaRPr lang="ko-KR" altLang="en-US" sz="850" b="0" dirty="0">
+                        <a:latin typeface="+mn-ea"/>
+                        <a:ea typeface="+mn-ea"/>
+                      </a:endParaRPr>
+                    </a:p>
+                  </a:txBody>
+                  <a:tcPr anchor="ctr">
+                    <a:lnL w="3175" cap="flat" cmpd="sng" algn="ctr">
+                      <a:noFill/>
+                      <a:prstDash val="solid"/>
+                      <a:round/>
+                      <a:headEnd type="none" w="med" len="med"/>
+                      <a:tailEnd type="none" w="med" len="med"/>
+                    </a:lnL>
+                    <a:lnR w="3175" cap="flat" cmpd="sng" algn="ctr">
+                      <a:solidFill>
+                        <a:schemeClr val="tx1">
+                          <a:lumMod val="50000"/>
+                          <a:lumOff val="50000"/>
+                        </a:schemeClr>
+                      </a:solidFill>
+                      <a:prstDash val="solid"/>
+                      <a:round/>
+                      <a:headEnd type="none" w="med" len="med"/>
+                      <a:tailEnd type="none" w="med" len="med"/>
+                    </a:lnR>
+                    <a:lnT w="3175" cap="flat" cmpd="sng" algn="ctr">
+                      <a:solidFill>
+                        <a:schemeClr val="tx1">
+                          <a:lumMod val="50000"/>
+                          <a:lumOff val="50000"/>
+                        </a:schemeClr>
+                      </a:solidFill>
+                      <a:prstDash val="solid"/>
+                      <a:round/>
+                      <a:headEnd type="none" w="med" len="med"/>
+                      <a:tailEnd type="none" w="med" len="med"/>
+                    </a:lnT>
+                    <a:lnB w="3175" cap="flat" cmpd="sng" algn="ctr">
+                      <a:solidFill>
+                        <a:schemeClr val="tx1">
+                          <a:lumMod val="50000"/>
+                          <a:lumOff val="50000"/>
+                        </a:schemeClr>
+                      </a:solidFill>
+                      <a:prstDash val="solid"/>
+                      <a:round/>
+                      <a:headEnd type="none" w="med" len="med"/>
+                      <a:tailEnd type="none" w="med" len="med"/>
+                    </a:lnB>
+                    <a:noFill/>
+                  </a:tcPr>
+                </a:tc>
+                <a:tc>
+                  <a:txBody>
+                    <a:bodyPr/>
+                    <a:lstStyle/>
+                    <a:p>
+                      <a:pPr algn="just" latinLnBrk="1">
+                        <a:lnSpc>
+                          <a:spcPct val="120000"/>
+                        </a:lnSpc>
+                      </a:pPr>
+                      <a:endParaRPr lang="ko-KR" altLang="en-US" sz="850" b="0" dirty="0">
+                        <a:latin typeface="+mn-ea"/>
+                        <a:ea typeface="+mn-ea"/>
+                      </a:endParaRPr>
+                    </a:p>
+                  </a:txBody>
+                  <a:tcPr anchor="ctr">
+                    <a:lnL w="3175" cap="flat" cmpd="sng" algn="ctr">
+                      <a:solidFill>
+                        <a:schemeClr val="tx1">
+                          <a:lumMod val="50000"/>
+                          <a:lumOff val="50000"/>
+                        </a:schemeClr>
+                      </a:solidFill>
+                      <a:prstDash val="solid"/>
+                      <a:round/>
+                      <a:headEnd type="none" w="med" len="med"/>
+                      <a:tailEnd type="none" w="med" len="med"/>
+                    </a:lnL>
+                    <a:lnR w="3175" cap="flat" cmpd="sng" algn="ctr">
+                      <a:noFill/>
+                      <a:prstDash val="solid"/>
+                      <a:round/>
+                      <a:headEnd type="none" w="med" len="med"/>
+                      <a:tailEnd type="none" w="med" len="med"/>
+                    </a:lnR>
+                    <a:lnT w="3175" cap="flat" cmpd="sng" algn="ctr">
+                      <a:solidFill>
+                        <a:schemeClr val="tx1">
+                          <a:lumMod val="50000"/>
+                          <a:lumOff val="50000"/>
+                        </a:schemeClr>
+                      </a:solidFill>
+                      <a:prstDash val="solid"/>
+                      <a:round/>
+                      <a:headEnd type="none" w="med" len="med"/>
+                      <a:tailEnd type="none" w="med" len="med"/>
+                    </a:lnT>
+                    <a:lnB w="3175" cap="flat" cmpd="sng" algn="ctr">
+                      <a:solidFill>
+                        <a:schemeClr val="tx1">
+                          <a:lumMod val="50000"/>
+                          <a:lumOff val="50000"/>
+                        </a:schemeClr>
+                      </a:solidFill>
+                      <a:prstDash val="solid"/>
+                      <a:round/>
+                      <a:headEnd type="none" w="med" len="med"/>
+                      <a:tailEnd type="none" w="med" len="med"/>
+                    </a:lnB>
+                    <a:noFill/>
+                  </a:tcPr>
+                </a:tc>
+                <a:extLst>
+                  <a:ext uri="{0D108BD9-81ED-4DB2-BD59-A6C34878D82A}">
+                    <a16:rowId xmlns:a16="http://schemas.microsoft.com/office/drawing/2014/main" val="1199453169"/>
+                  </a:ext>
+                </a:extLst>
+              </a:tr>
+            </a:tbl>
+          </a:graphicData>
+        </a:graphic>
+      </p:graphicFrame>
+      <p:sp>
+        <p:nvSpPr>
+          <p:cNvPr id="8" name="TextBox 7">
+            <a:extLst>
+              <a:ext uri="{FF2B5EF4-FFF2-40B4-BE49-F238E27FC236}">
+                <a16:creationId xmlns:a16="http://schemas.microsoft.com/office/drawing/2014/main" id="{DDF58C48-5157-4FFA-B714-C02B198B9885}"/>
+              </a:ext>
+            </a:extLst>
+          </p:cNvPr>
+          <p:cNvSpPr txBox="1"/>
+          <p:nvPr/>
+        </p:nvSpPr>
+        <p:spPr>
+          <a:xfrm>
+            <a:off x="11780252" y="106980"/>
+            <a:ext cx="248786" cy="230832"/>
+          </a:xfrm>
+          <a:prstGeom prst="rect">
+            <a:avLst/>
+          </a:prstGeom>
+          <a:noFill/>
+        </p:spPr>
+        <p:txBody>
+          <a:bodyPr wrap="none" rtlCol="0">
+            <a:spAutoFit/>
+          </a:bodyPr>
+          <a:lstStyle/>
+          <a:p>
+            <a:fld id="{944918D1-1C8F-48E6-92D4-4089F97E8793}" type="slidenum">
+              <a:rPr lang="ko-KR" altLang="en-US" sz="900" smtClean="0"/>
+              <a:t>10</a:t>
+            </a:fld>
+            <a:endParaRPr lang="ko-KR" altLang="en-US" sz="900" dirty="0"/>
+          </a:p>
+        </p:txBody>
+      </p:sp>
+      <p:pic>
+        <p:nvPicPr>
+          <p:cNvPr id="3" name="그림 2">
+            <a:extLst>
+              <a:ext uri="{FF2B5EF4-FFF2-40B4-BE49-F238E27FC236}">
+                <a16:creationId xmlns:a16="http://schemas.microsoft.com/office/drawing/2014/main" id="{082E1012-27A1-EAE2-81E9-FF0B37E1A6F7}"/>
+              </a:ext>
+            </a:extLst>
+          </p:cNvPr>
+          <p:cNvPicPr>
+            <a:picLocks noChangeAspect="1"/>
+          </p:cNvPicPr>
+          <p:nvPr/>
+        </p:nvPicPr>
+        <p:blipFill>
+          <a:blip r:embed="rId2">
+            <a:extLst>
+              <a:ext uri="{28A0092B-C50C-407E-A947-70E740481C1C}">
+                <a14:useLocalDpi xmlns:a14="http://schemas.microsoft.com/office/drawing/2010/main" val="0"/>
+              </a:ext>
+            </a:extLst>
+          </a:blip>
+          <a:stretch>
+            <a:fillRect/>
+          </a:stretch>
+        </p:blipFill>
+        <p:spPr>
+          <a:xfrm>
+            <a:off x="1" y="1289870"/>
+            <a:ext cx="8539361" cy="4278260"/>
+          </a:xfrm>
+          <a:prstGeom prst="rect">
+            <a:avLst/>
+          </a:prstGeom>
+        </p:spPr>
+      </p:pic>
+    </p:spTree>
+    <p:extLst>
+      <p:ext uri="{BB962C8B-B14F-4D97-AF65-F5344CB8AC3E}">
+        <p14:creationId xmlns:p14="http://schemas.microsoft.com/office/powerpoint/2010/main" val="1499549176"/>
+      </p:ext>
+    </p:extLst>
+  </p:cSld>
+  <p:clrMapOvr>
+    <a:masterClrMapping/>
+  </p:clrMapOvr>
+</p:sld>
+</file>
+
+<file path=ppt/slides/slide11.xml><?xml version="1.0" encoding="utf-8"?>
+<p:sld xmlns:a="http://schemas.openxmlformats.org/drawingml/2006/main" xmlns:r="http://schemas.openxmlformats.org/officeDocument/2006/relationships" xmlns:p="http://schemas.openxmlformats.org/presentationml/2006/main">
+  <p:cSld>
+    <p:spTree>
+      <p:nvGrpSpPr>
+        <p:cNvPr id="1" name=""/>
+        <p:cNvGrpSpPr/>
+        <p:nvPr/>
+      </p:nvGrpSpPr>
+      <p:grpSpPr>
+        <a:xfrm>
+          <a:off x="0" y="0"/>
+          <a:ext cx="0" cy="0"/>
+          <a:chOff x="0" y="0"/>
+          <a:chExt cx="0" cy="0"/>
+        </a:xfrm>
+      </p:grpSpPr>
+      <p:sp>
+        <p:nvSpPr>
+          <p:cNvPr id="4" name="텍스트 개체 틀 3">
+            <a:extLst>
+              <a:ext uri="{FF2B5EF4-FFF2-40B4-BE49-F238E27FC236}">
+                <a16:creationId xmlns:a16="http://schemas.microsoft.com/office/drawing/2014/main" id="{32E285E0-25D1-4806-B9DF-3590BD92D435}"/>
+              </a:ext>
+            </a:extLst>
+          </p:cNvPr>
+          <p:cNvSpPr>
+            <a:spLocks noGrp="1"/>
+          </p:cNvSpPr>
+          <p:nvPr>
+            <p:ph type="body" sz="quarter" idx="10"/>
+          </p:nvPr>
+        </p:nvSpPr>
+        <p:spPr/>
+        <p:txBody>
+          <a:bodyPr/>
+          <a:lstStyle/>
+          <a:p>
+            <a:r>
               <a:rPr lang="en-US" altLang="ko-KR" dirty="0" err="1"/>
               <a:t>TRADEBOARD_datail</a:t>
             </a:r>
@@ -5271,7 +7101,7 @@
           <a:p>
             <a:fld id="{944918D1-1C8F-48E6-92D4-4089F97E8793}" type="slidenum">
               <a:rPr lang="ko-KR" altLang="en-US" sz="900" smtClean="0"/>
-              <a:t>10</a:t>
+              <a:t>11</a:t>
             </a:fld>
             <a:endParaRPr lang="ko-KR" altLang="en-US" sz="900" dirty="0"/>
           </a:p>
@@ -5326,7 +7156,7 @@
 </p:sld>
 </file>
 
-<file path=ppt/slides/slide11.xml><?xml version="1.0" encoding="utf-8"?>
+<file path=ppt/slides/slide12.xml><?xml version="1.0" encoding="utf-8"?>
 <p:sld xmlns:a="http://schemas.openxmlformats.org/drawingml/2006/main" xmlns:r="http://schemas.openxmlformats.org/officeDocument/2006/relationships" xmlns:p="http://schemas.openxmlformats.org/presentationml/2006/main">
   <p:cSld>
     <p:spTree>
@@ -7032,7 +8862,7 @@
           <a:p>
             <a:fld id="{944918D1-1C8F-48E6-92D4-4089F97E8793}" type="slidenum">
               <a:rPr lang="ko-KR" altLang="en-US" sz="900" smtClean="0"/>
-              <a:t>11</a:t>
+              <a:t>12</a:t>
             </a:fld>
             <a:endParaRPr lang="ko-KR" altLang="en-US" sz="900" dirty="0"/>
           </a:p>
@@ -11398,6 +13228,94 @@
       </p:grpSpPr>
       <p:sp>
         <p:nvSpPr>
+          <p:cNvPr id="2" name="제목 1">
+            <a:extLst>
+              <a:ext uri="{FF2B5EF4-FFF2-40B4-BE49-F238E27FC236}">
+                <a16:creationId xmlns:a16="http://schemas.microsoft.com/office/drawing/2014/main" id="{3DDF9489-DC47-AA62-2A68-B54102221E44}"/>
+              </a:ext>
+            </a:extLst>
+          </p:cNvPr>
+          <p:cNvSpPr>
+            <a:spLocks noGrp="1"/>
+          </p:cNvSpPr>
+          <p:nvPr>
+            <p:ph type="title"/>
+          </p:nvPr>
+        </p:nvSpPr>
+        <p:spPr/>
+        <p:txBody>
+          <a:bodyPr/>
+          <a:lstStyle/>
+          <a:p>
+            <a:r>
+              <a:rPr lang="ko-KR" altLang="en-US" dirty="0"/>
+              <a:t>화면 구상도</a:t>
+            </a:r>
+          </a:p>
+        </p:txBody>
+      </p:sp>
+      <p:pic>
+        <p:nvPicPr>
+          <p:cNvPr id="4" name="그림 3">
+            <a:extLst>
+              <a:ext uri="{FF2B5EF4-FFF2-40B4-BE49-F238E27FC236}">
+                <a16:creationId xmlns:a16="http://schemas.microsoft.com/office/drawing/2014/main" id="{87C626E7-B9E3-DB15-254A-2A7ED3CF4374}"/>
+              </a:ext>
+            </a:extLst>
+          </p:cNvPr>
+          <p:cNvPicPr>
+            <a:picLocks noChangeAspect="1"/>
+          </p:cNvPicPr>
+          <p:nvPr/>
+        </p:nvPicPr>
+        <p:blipFill>
+          <a:blip r:embed="rId2"/>
+          <a:stretch>
+            <a:fillRect/>
+          </a:stretch>
+        </p:blipFill>
+        <p:spPr>
+          <a:xfrm>
+            <a:off x="2495600" y="1340768"/>
+            <a:ext cx="7338082" cy="5000081"/>
+          </a:xfrm>
+          <a:prstGeom prst="rect">
+            <a:avLst/>
+          </a:prstGeom>
+        </p:spPr>
+      </p:pic>
+    </p:spTree>
+    <p:extLst>
+      <p:ext uri="{BB962C8B-B14F-4D97-AF65-F5344CB8AC3E}">
+        <p14:creationId xmlns:p14="http://schemas.microsoft.com/office/powerpoint/2010/main" val="1141407044"/>
+      </p:ext>
+    </p:extLst>
+  </p:cSld>
+  <p:clrMapOvr>
+    <a:masterClrMapping/>
+  </p:clrMapOvr>
+</p:sld>
+</file>
+
+<file path=ppt/slides/slide5.xml><?xml version="1.0" encoding="utf-8"?>
+<p:sld xmlns:a="http://schemas.openxmlformats.org/drawingml/2006/main" xmlns:r="http://schemas.openxmlformats.org/officeDocument/2006/relationships" xmlns:p="http://schemas.openxmlformats.org/presentationml/2006/main">
+  <p:cSld>
+    <p:spTree>
+      <p:nvGrpSpPr>
+        <p:cNvPr id="1" name=""/>
+        <p:cNvGrpSpPr/>
+        <p:nvPr/>
+      </p:nvGrpSpPr>
+      <p:grpSpPr>
+        <a:xfrm>
+          <a:off x="0" y="0"/>
+          <a:ext cx="0" cy="0"/>
+          <a:chOff x="0" y="0"/>
+          <a:chExt cx="0" cy="0"/>
+        </a:xfrm>
+      </p:grpSpPr>
+      <p:sp>
+        <p:nvSpPr>
           <p:cNvPr id="4" name="텍스트 개체 틀 3">
             <a:extLst>
               <a:ext uri="{FF2B5EF4-FFF2-40B4-BE49-F238E27FC236}">
@@ -12941,7 +14859,7 @@
           <a:p>
             <a:fld id="{944918D1-1C8F-48E6-92D4-4089F97E8793}" type="slidenum">
               <a:rPr lang="ko-KR" altLang="en-US" sz="900" smtClean="0"/>
-              <a:t>4</a:t>
+              <a:t>5</a:t>
             </a:fld>
             <a:endParaRPr lang="ko-KR" altLang="en-US" sz="900" dirty="0"/>
           </a:p>
@@ -12996,7 +14914,7 @@
 </p:sld>
 </file>
 
-<file path=ppt/slides/slide5.xml><?xml version="1.0" encoding="utf-8"?>
+<file path=ppt/slides/slide6.xml><?xml version="1.0" encoding="utf-8"?>
 <p:sld xmlns:a="http://schemas.openxmlformats.org/drawingml/2006/main" xmlns:r="http://schemas.openxmlformats.org/officeDocument/2006/relationships" xmlns:p="http://schemas.openxmlformats.org/presentationml/2006/main">
   <p:cSld>
     <p:spTree>
@@ -14462,7 +16380,7 @@
           <a:p>
             <a:fld id="{944918D1-1C8F-48E6-92D4-4089F97E8793}" type="slidenum">
               <a:rPr lang="ko-KR" altLang="en-US" sz="900" smtClean="0"/>
-              <a:t>5</a:t>
+              <a:t>6</a:t>
             </a:fld>
             <a:endParaRPr lang="ko-KR" altLang="en-US" sz="900" dirty="0"/>
           </a:p>
@@ -14517,7 +16435,7 @@
 </p:sld>
 </file>
 
-<file path=ppt/slides/slide6.xml><?xml version="1.0" encoding="utf-8"?>
+<file path=ppt/slides/slide7.xml><?xml version="1.0" encoding="utf-8"?>
 <p:sld xmlns:a="http://schemas.openxmlformats.org/drawingml/2006/main" xmlns:r="http://schemas.openxmlformats.org/officeDocument/2006/relationships" xmlns:p="http://schemas.openxmlformats.org/presentationml/2006/main">
   <p:cSld>
     <p:spTree>
@@ -16292,7 +18210,7 @@
           <a:p>
             <a:fld id="{944918D1-1C8F-48E6-92D4-4089F97E8793}" type="slidenum">
               <a:rPr lang="ko-KR" altLang="en-US" sz="900" smtClean="0"/>
-              <a:t>6</a:t>
+              <a:t>7</a:t>
             </a:fld>
             <a:endParaRPr lang="ko-KR" altLang="en-US" sz="900" dirty="0"/>
           </a:p>
@@ -16347,7 +18265,7 @@
 </p:sld>
 </file>
 
-<file path=ppt/slides/slide7.xml><?xml version="1.0" encoding="utf-8"?>
+<file path=ppt/slides/slide8.xml><?xml version="1.0" encoding="utf-8"?>
 <p:sld xmlns:a="http://schemas.openxmlformats.org/drawingml/2006/main" xmlns:r="http://schemas.openxmlformats.org/officeDocument/2006/relationships" xmlns:p="http://schemas.openxmlformats.org/presentationml/2006/main">
   <p:cSld>
     <p:spTree>
@@ -17974,7 +19892,7 @@
           <a:p>
             <a:fld id="{944918D1-1C8F-48E6-92D4-4089F97E8793}" type="slidenum">
               <a:rPr lang="ko-KR" altLang="en-US" sz="900" smtClean="0"/>
-              <a:t>7</a:t>
+              <a:t>8</a:t>
             </a:fld>
             <a:endParaRPr lang="ko-KR" altLang="en-US" sz="900" dirty="0"/>
           </a:p>
@@ -18023,7 +19941,7 @@
 </p:sld>
 </file>
 
-<file path=ppt/slides/slide8.xml><?xml version="1.0" encoding="utf-8"?>
+<file path=ppt/slides/slide9.xml><?xml version="1.0" encoding="utf-8"?>
 <p:sld xmlns:a="http://schemas.openxmlformats.org/drawingml/2006/main" xmlns:r="http://schemas.openxmlformats.org/officeDocument/2006/relationships" xmlns:p="http://schemas.openxmlformats.org/presentationml/2006/main">
   <p:cSld>
     <p:spTree>
@@ -19917,7 +21835,7 @@
           <a:p>
             <a:fld id="{944918D1-1C8F-48E6-92D4-4089F97E8793}" type="slidenum">
               <a:rPr lang="ko-KR" altLang="en-US" sz="900" smtClean="0"/>
-              <a:t>8</a:t>
+              <a:t>9</a:t>
             </a:fld>
             <a:endParaRPr lang="ko-KR" altLang="en-US" sz="900" dirty="0"/>
           </a:p>
@@ -19963,1834 +21881,6 @@
     <p:extLst>
       <p:ext uri="{BB962C8B-B14F-4D97-AF65-F5344CB8AC3E}">
         <p14:creationId xmlns:p14="http://schemas.microsoft.com/office/powerpoint/2010/main" val="3017830662"/>
-      </p:ext>
-    </p:extLst>
-  </p:cSld>
-  <p:clrMapOvr>
-    <a:masterClrMapping/>
-  </p:clrMapOvr>
-</p:sld>
-</file>
-
-<file path=ppt/slides/slide9.xml><?xml version="1.0" encoding="utf-8"?>
-<p:sld xmlns:a="http://schemas.openxmlformats.org/drawingml/2006/main" xmlns:r="http://schemas.openxmlformats.org/officeDocument/2006/relationships" xmlns:p="http://schemas.openxmlformats.org/presentationml/2006/main">
-  <p:cSld>
-    <p:spTree>
-      <p:nvGrpSpPr>
-        <p:cNvPr id="1" name=""/>
-        <p:cNvGrpSpPr/>
-        <p:nvPr/>
-      </p:nvGrpSpPr>
-      <p:grpSpPr>
-        <a:xfrm>
-          <a:off x="0" y="0"/>
-          <a:ext cx="0" cy="0"/>
-          <a:chOff x="0" y="0"/>
-          <a:chExt cx="0" cy="0"/>
-        </a:xfrm>
-      </p:grpSpPr>
-      <p:sp>
-        <p:nvSpPr>
-          <p:cNvPr id="4" name="텍스트 개체 틀 3">
-            <a:extLst>
-              <a:ext uri="{FF2B5EF4-FFF2-40B4-BE49-F238E27FC236}">
-                <a16:creationId xmlns:a16="http://schemas.microsoft.com/office/drawing/2014/main" id="{32E285E0-25D1-4806-B9DF-3590BD92D435}"/>
-              </a:ext>
-            </a:extLst>
-          </p:cNvPr>
-          <p:cNvSpPr>
-            <a:spLocks noGrp="1"/>
-          </p:cNvSpPr>
-          <p:nvPr>
-            <p:ph type="body" sz="quarter" idx="10"/>
-          </p:nvPr>
-        </p:nvSpPr>
-        <p:spPr/>
-        <p:txBody>
-          <a:bodyPr/>
-          <a:lstStyle/>
-          <a:p>
-            <a:r>
-              <a:rPr lang="en-US" altLang="ko-KR" dirty="0"/>
-              <a:t>TRADEBOARD</a:t>
-            </a:r>
-            <a:endParaRPr lang="ko-KR" altLang="en-US" dirty="0"/>
-          </a:p>
-        </p:txBody>
-      </p:sp>
-      <p:sp>
-        <p:nvSpPr>
-          <p:cNvPr id="5" name="텍스트 개체 틀 4">
-            <a:extLst>
-              <a:ext uri="{FF2B5EF4-FFF2-40B4-BE49-F238E27FC236}">
-                <a16:creationId xmlns:a16="http://schemas.microsoft.com/office/drawing/2014/main" id="{181CE6EC-43A5-4409-9C12-1C3782E8CB22}"/>
-              </a:ext>
-            </a:extLst>
-          </p:cNvPr>
-          <p:cNvSpPr>
-            <a:spLocks noGrp="1"/>
-          </p:cNvSpPr>
-          <p:nvPr>
-            <p:ph type="body" sz="quarter" idx="11"/>
-          </p:nvPr>
-        </p:nvSpPr>
-        <p:spPr/>
-        <p:txBody>
-          <a:bodyPr/>
-          <a:lstStyle/>
-          <a:p>
-            <a:endParaRPr lang="en-US" altLang="ko-KR" dirty="0"/>
-          </a:p>
-          <a:p>
-            <a:r>
-              <a:rPr lang="en-US" altLang="ko-KR" dirty="0"/>
-              <a:t>zookeepers</a:t>
-            </a:r>
-            <a:endParaRPr lang="ko-KR" altLang="en-US" dirty="0"/>
-          </a:p>
-          <a:p>
-            <a:endParaRPr lang="ko-KR" altLang="en-US" dirty="0"/>
-          </a:p>
-        </p:txBody>
-      </p:sp>
-      <p:graphicFrame>
-        <p:nvGraphicFramePr>
-          <p:cNvPr id="7" name="표 6">
-            <a:extLst>
-              <a:ext uri="{FF2B5EF4-FFF2-40B4-BE49-F238E27FC236}">
-                <a16:creationId xmlns:a16="http://schemas.microsoft.com/office/drawing/2014/main" id="{EE672C9C-2796-4CD4-B138-FB14ECB9EFA6}"/>
-              </a:ext>
-            </a:extLst>
-          </p:cNvPr>
-          <p:cNvGraphicFramePr>
-            <a:graphicFrameLocks noGrp="1"/>
-          </p:cNvGraphicFramePr>
-          <p:nvPr>
-            <p:extLst>
-              <p:ext uri="{D42A27DB-BD31-4B8C-83A1-F6EECF244321}">
-                <p14:modId xmlns:p14="http://schemas.microsoft.com/office/powerpoint/2010/main" val="346107679"/>
-              </p:ext>
-            </p:extLst>
-          </p:nvPr>
-        </p:nvGraphicFramePr>
-        <p:xfrm>
-          <a:off x="8688288" y="476672"/>
-          <a:ext cx="3384376" cy="2817704"/>
-        </p:xfrm>
-        <a:graphic>
-          <a:graphicData uri="http://schemas.openxmlformats.org/drawingml/2006/table">
-            <a:tbl>
-              <a:tblPr firstRow="1" bandRow="1">
-                <a:tableStyleId>{5C22544A-7EE6-4342-B048-85BDC9FD1C3A}</a:tableStyleId>
-              </a:tblPr>
-              <a:tblGrid>
-                <a:gridCol w="403256">
-                  <a:extLst>
-                    <a:ext uri="{9D8B030D-6E8A-4147-A177-3AD203B41FA5}">
-                      <a16:colId xmlns:a16="http://schemas.microsoft.com/office/drawing/2014/main" val="74772085"/>
-                    </a:ext>
-                  </a:extLst>
-                </a:gridCol>
-                <a:gridCol w="2981120">
-                  <a:extLst>
-                    <a:ext uri="{9D8B030D-6E8A-4147-A177-3AD203B41FA5}">
-                      <a16:colId xmlns:a16="http://schemas.microsoft.com/office/drawing/2014/main" val="2572474025"/>
-                    </a:ext>
-                  </a:extLst>
-                </a:gridCol>
-              </a:tblGrid>
-              <a:tr h="258850">
-                <a:tc gridSpan="2">
-                  <a:txBody>
-                    <a:bodyPr/>
-                    <a:lstStyle/>
-                    <a:p>
-                      <a:pPr marL="0" marR="0" lvl="0" indent="0" algn="l" defTabSz="914400" rtl="0" eaLnBrk="1" fontAlgn="auto" latinLnBrk="1" hangingPunct="1">
-                        <a:lnSpc>
-                          <a:spcPct val="100000"/>
-                        </a:lnSpc>
-                        <a:spcBef>
-                          <a:spcPts val="0"/>
-                        </a:spcBef>
-                        <a:spcAft>
-                          <a:spcPts val="0"/>
-                        </a:spcAft>
-                        <a:buClrTx/>
-                        <a:buSzTx/>
-                        <a:buFontTx/>
-                        <a:buNone/>
-                        <a:tabLst/>
-                        <a:defRPr/>
-                      </a:pPr>
-                      <a:r>
-                        <a:rPr lang="en-US" altLang="ko-KR" sz="900" b="1" dirty="0">
-                          <a:solidFill>
-                            <a:srgbClr val="4E5263"/>
-                          </a:solidFill>
-                          <a:latin typeface="+mn-ea"/>
-                          <a:ea typeface="+mn-ea"/>
-                          <a:sym typeface="맑은 고딕"/>
-                        </a:rPr>
-                        <a:t>Summery.</a:t>
-                      </a:r>
-                      <a:endParaRPr lang="en" altLang="ko-KR" sz="900" b="1" dirty="0">
-                        <a:solidFill>
-                          <a:srgbClr val="4E5263"/>
-                        </a:solidFill>
-                        <a:latin typeface="+mn-ea"/>
-                        <a:ea typeface="+mn-ea"/>
-                        <a:sym typeface="맑은 고딕"/>
-                      </a:endParaRPr>
-                    </a:p>
-                  </a:txBody>
-                  <a:tcPr anchor="ctr">
-                    <a:lnL w="3175" cap="flat" cmpd="sng" algn="ctr">
-                      <a:noFill/>
-                      <a:prstDash val="solid"/>
-                      <a:round/>
-                      <a:headEnd type="none" w="med" len="med"/>
-                      <a:tailEnd type="none" w="med" len="med"/>
-                    </a:lnL>
-                    <a:lnR w="3175" cap="flat" cmpd="sng" algn="ctr">
-                      <a:noFill/>
-                      <a:prstDash val="solid"/>
-                      <a:round/>
-                      <a:headEnd type="none" w="med" len="med"/>
-                      <a:tailEnd type="none" w="med" len="med"/>
-                    </a:lnR>
-                    <a:lnT w="3175" cap="flat" cmpd="sng" algn="ctr">
-                      <a:noFill/>
-                      <a:prstDash val="solid"/>
-                      <a:round/>
-                      <a:headEnd type="none" w="med" len="med"/>
-                      <a:tailEnd type="none" w="med" len="med"/>
-                    </a:lnT>
-                    <a:lnB w="3175" cap="flat" cmpd="sng" algn="ctr">
-                      <a:solidFill>
-                        <a:schemeClr val="bg1">
-                          <a:lumMod val="65000"/>
-                        </a:schemeClr>
-                      </a:solidFill>
-                      <a:prstDash val="solid"/>
-                      <a:round/>
-                      <a:headEnd type="none" w="med" len="med"/>
-                      <a:tailEnd type="none" w="med" len="med"/>
-                    </a:lnB>
-                    <a:solidFill>
-                      <a:schemeClr val="bg1"/>
-                    </a:solidFill>
-                  </a:tcPr>
-                </a:tc>
-                <a:tc hMerge="1">
-                  <a:txBody>
-                    <a:bodyPr/>
-                    <a:lstStyle/>
-                    <a:p>
-                      <a:pPr marL="0" marR="0" lvl="0" indent="0" algn="l" defTabSz="914400" rtl="0" eaLnBrk="1" fontAlgn="auto" latinLnBrk="1" hangingPunct="1">
-                        <a:lnSpc>
-                          <a:spcPct val="100000"/>
-                        </a:lnSpc>
-                        <a:spcBef>
-                          <a:spcPts val="0"/>
-                        </a:spcBef>
-                        <a:spcAft>
-                          <a:spcPts val="0"/>
-                        </a:spcAft>
-                        <a:buClrTx/>
-                        <a:buSzTx/>
-                        <a:buFontTx/>
-                        <a:buNone/>
-                        <a:tabLst/>
-                        <a:defRPr/>
-                      </a:pPr>
-                      <a:endParaRPr lang="en" altLang="ko-KR" sz="900" b="1" dirty="0">
-                        <a:solidFill>
-                          <a:srgbClr val="4E5263"/>
-                        </a:solidFill>
-                        <a:latin typeface="SF Pro Text" pitchFamily="2" charset="0"/>
-                        <a:ea typeface="SF Pro Text" pitchFamily="2" charset="0"/>
-                        <a:sym typeface="맑은 고딕"/>
-                      </a:endParaRPr>
-                    </a:p>
-                  </a:txBody>
-                  <a:tcPr anchor="ctr">
-                    <a:lnL w="3175" cap="flat" cmpd="sng" algn="ctr">
-                      <a:solidFill>
-                        <a:schemeClr val="tx1">
-                          <a:lumMod val="50000"/>
-                          <a:lumOff val="50000"/>
-                        </a:schemeClr>
-                      </a:solidFill>
-                      <a:prstDash val="solid"/>
-                      <a:round/>
-                      <a:headEnd type="none" w="med" len="med"/>
-                      <a:tailEnd type="none" w="med" len="med"/>
-                    </a:lnL>
-                    <a:lnR w="3175" cap="flat" cmpd="sng" algn="ctr">
-                      <a:noFill/>
-                      <a:prstDash val="solid"/>
-                      <a:round/>
-                      <a:headEnd type="none" w="med" len="med"/>
-                      <a:tailEnd type="none" w="med" len="med"/>
-                    </a:lnR>
-                    <a:lnT w="3175" cap="flat" cmpd="sng" algn="ctr">
-                      <a:noFill/>
-                      <a:prstDash val="solid"/>
-                      <a:round/>
-                      <a:headEnd type="none" w="med" len="med"/>
-                      <a:tailEnd type="none" w="med" len="med"/>
-                    </a:lnT>
-                    <a:lnB w="3175" cap="flat" cmpd="sng" algn="ctr">
-                      <a:solidFill>
-                        <a:schemeClr val="tx1">
-                          <a:lumMod val="50000"/>
-                          <a:lumOff val="50000"/>
-                        </a:schemeClr>
-                      </a:solidFill>
-                      <a:prstDash val="solid"/>
-                      <a:round/>
-                      <a:headEnd type="none" w="med" len="med"/>
-                      <a:tailEnd type="none" w="med" len="med"/>
-                    </a:lnB>
-                    <a:noFill/>
-                  </a:tcPr>
-                </a:tc>
-                <a:extLst>
-                  <a:ext uri="{0D108BD9-81ED-4DB2-BD59-A6C34878D82A}">
-                    <a16:rowId xmlns:a16="http://schemas.microsoft.com/office/drawing/2014/main" val="1283880267"/>
-                  </a:ext>
-                </a:extLst>
-              </a:tr>
-              <a:tr h="786307">
-                <a:tc gridSpan="2">
-                  <a:txBody>
-                    <a:bodyPr/>
-                    <a:lstStyle/>
-                    <a:p>
-                      <a:pPr marL="108000" marR="0" lvl="0" indent="-108000" algn="just" defTabSz="914400" rtl="0" eaLnBrk="1" fontAlgn="auto" latinLnBrk="1" hangingPunct="1">
-                        <a:lnSpc>
-                          <a:spcPct val="120000"/>
-                        </a:lnSpc>
-                        <a:spcBef>
-                          <a:spcPts val="0"/>
-                        </a:spcBef>
-                        <a:spcAft>
-                          <a:spcPts val="0"/>
-                        </a:spcAft>
-                        <a:buClrTx/>
-                        <a:buSzTx/>
-                        <a:buFont typeface="Arial" panose="020B0604020202020204" pitchFamily="34" charset="0"/>
-                        <a:buChar char="•"/>
-                        <a:tabLst/>
-                        <a:defRPr/>
-                      </a:pPr>
-                      <a:r>
-                        <a:rPr lang="ko-KR" altLang="en-US" sz="800" b="0" dirty="0">
-                          <a:solidFill>
-                            <a:schemeClr val="tx1"/>
-                          </a:solidFill>
-                          <a:latin typeface="+mn-ea"/>
-                          <a:ea typeface="+mn-ea"/>
-                          <a:sym typeface="맑은 고딕"/>
-                        </a:rPr>
-                        <a:t>게시글 </a:t>
-                      </a:r>
-                      <a:r>
-                        <a:rPr lang="ko-KR" altLang="en-US" sz="800" b="0" dirty="0" err="1">
-                          <a:solidFill>
-                            <a:schemeClr val="tx1"/>
-                          </a:solidFill>
-                          <a:latin typeface="+mn-ea"/>
-                          <a:ea typeface="+mn-ea"/>
-                          <a:sym typeface="맑은 고딕"/>
-                        </a:rPr>
-                        <a:t>페이징처리</a:t>
-                      </a:r>
-                      <a:r>
-                        <a:rPr lang="en-US" altLang="ko-KR" sz="800" b="0" dirty="0">
-                          <a:solidFill>
-                            <a:schemeClr val="tx1"/>
-                          </a:solidFill>
-                          <a:latin typeface="+mn-ea"/>
-                          <a:ea typeface="+mn-ea"/>
-                          <a:sym typeface="맑은 고딕"/>
-                        </a:rPr>
-                        <a:t>, </a:t>
-                      </a:r>
-                      <a:r>
-                        <a:rPr lang="ko-KR" altLang="en-US" sz="800" b="0" dirty="0">
-                          <a:solidFill>
-                            <a:schemeClr val="tx1"/>
-                          </a:solidFill>
-                          <a:latin typeface="+mn-ea"/>
-                          <a:ea typeface="+mn-ea"/>
-                          <a:sym typeface="맑은 고딕"/>
-                        </a:rPr>
-                        <a:t>카테고리 별 </a:t>
-                      </a:r>
-                      <a:r>
-                        <a:rPr lang="ko-KR" altLang="en-US" sz="800" b="0" dirty="0" err="1">
-                          <a:solidFill>
-                            <a:schemeClr val="tx1"/>
-                          </a:solidFill>
-                          <a:latin typeface="+mn-ea"/>
-                          <a:ea typeface="+mn-ea"/>
-                          <a:sym typeface="맑은 고딕"/>
-                        </a:rPr>
-                        <a:t>판매글</a:t>
-                      </a:r>
-                      <a:r>
-                        <a:rPr lang="ko-KR" altLang="en-US" sz="800" b="0" dirty="0">
-                          <a:solidFill>
-                            <a:schemeClr val="tx1"/>
-                          </a:solidFill>
-                          <a:latin typeface="+mn-ea"/>
-                          <a:ea typeface="+mn-ea"/>
-                          <a:sym typeface="맑은 고딕"/>
-                        </a:rPr>
-                        <a:t> 목록</a:t>
-                      </a:r>
-                      <a:r>
-                        <a:rPr lang="en-US" altLang="ko-KR" sz="800" b="0" dirty="0">
-                          <a:solidFill>
-                            <a:schemeClr val="tx1"/>
-                          </a:solidFill>
-                          <a:latin typeface="+mn-ea"/>
-                          <a:ea typeface="+mn-ea"/>
-                          <a:sym typeface="맑은 고딕"/>
-                        </a:rPr>
-                        <a:t>, </a:t>
-                      </a:r>
-                      <a:r>
-                        <a:rPr lang="ko-KR" altLang="en-US" sz="800" b="0" dirty="0" err="1">
-                          <a:solidFill>
-                            <a:schemeClr val="tx1"/>
-                          </a:solidFill>
-                          <a:latin typeface="+mn-ea"/>
-                          <a:ea typeface="+mn-ea"/>
-                          <a:sym typeface="맑은 고딕"/>
-                        </a:rPr>
-                        <a:t>판매글</a:t>
-                      </a:r>
-                      <a:r>
-                        <a:rPr lang="ko-KR" altLang="en-US" sz="800" b="0" dirty="0">
-                          <a:solidFill>
-                            <a:schemeClr val="tx1"/>
-                          </a:solidFill>
-                          <a:latin typeface="+mn-ea"/>
-                          <a:ea typeface="+mn-ea"/>
-                          <a:sym typeface="맑은 고딕"/>
-                        </a:rPr>
-                        <a:t> 검색 구현</a:t>
-                      </a:r>
-                      <a:endParaRPr lang="en-US" altLang="ko-KR" sz="800" b="0" dirty="0">
-                        <a:solidFill>
-                          <a:schemeClr val="tx1"/>
-                        </a:solidFill>
-                        <a:latin typeface="+mn-ea"/>
-                        <a:ea typeface="+mn-ea"/>
-                        <a:sym typeface="맑은 고딕"/>
-                      </a:endParaRPr>
-                    </a:p>
-                    <a:p>
-                      <a:pPr marL="108000" marR="0" lvl="0" indent="-108000" algn="just" defTabSz="914400" rtl="0" eaLnBrk="1" fontAlgn="auto" latinLnBrk="1" hangingPunct="1">
-                        <a:lnSpc>
-                          <a:spcPct val="120000"/>
-                        </a:lnSpc>
-                        <a:spcBef>
-                          <a:spcPts val="0"/>
-                        </a:spcBef>
-                        <a:spcAft>
-                          <a:spcPts val="0"/>
-                        </a:spcAft>
-                        <a:buClrTx/>
-                        <a:buSzTx/>
-                        <a:buFont typeface="Arial" panose="020B0604020202020204" pitchFamily="34" charset="0"/>
-                        <a:buChar char="•"/>
-                        <a:tabLst/>
-                        <a:defRPr/>
-                      </a:pPr>
-                      <a:r>
-                        <a:rPr lang="ko-KR" altLang="en-US" sz="800" b="0" dirty="0">
-                          <a:solidFill>
-                            <a:schemeClr val="tx1"/>
-                          </a:solidFill>
-                          <a:latin typeface="+mn-ea"/>
-                          <a:ea typeface="+mn-ea"/>
-                          <a:sym typeface="맑은 고딕"/>
-                        </a:rPr>
-                        <a:t>게시글 별 타이틀</a:t>
-                      </a:r>
-                      <a:r>
-                        <a:rPr lang="en-US" altLang="ko-KR" sz="800" b="0" dirty="0">
-                          <a:solidFill>
-                            <a:schemeClr val="tx1"/>
-                          </a:solidFill>
-                          <a:latin typeface="+mn-ea"/>
-                          <a:ea typeface="+mn-ea"/>
-                          <a:sym typeface="맑은 고딕"/>
-                        </a:rPr>
-                        <a:t>, </a:t>
-                      </a:r>
-                      <a:r>
-                        <a:rPr lang="ko-KR" altLang="en-US" sz="800" b="0" dirty="0">
-                          <a:solidFill>
-                            <a:schemeClr val="tx1"/>
-                          </a:solidFill>
-                          <a:latin typeface="+mn-ea"/>
-                          <a:ea typeface="+mn-ea"/>
-                          <a:sym typeface="맑은 고딕"/>
-                        </a:rPr>
-                        <a:t>가격</a:t>
-                      </a:r>
-                      <a:r>
-                        <a:rPr lang="en-US" altLang="ko-KR" sz="800" b="0" dirty="0">
-                          <a:solidFill>
-                            <a:schemeClr val="tx1"/>
-                          </a:solidFill>
-                          <a:latin typeface="+mn-ea"/>
-                          <a:ea typeface="+mn-ea"/>
-                          <a:sym typeface="맑은 고딕"/>
-                        </a:rPr>
-                        <a:t>, </a:t>
-                      </a:r>
-                      <a:r>
-                        <a:rPr lang="ko-KR" altLang="en-US" sz="800" b="0" dirty="0">
-                          <a:solidFill>
-                            <a:schemeClr val="tx1"/>
-                          </a:solidFill>
-                          <a:latin typeface="+mn-ea"/>
-                          <a:ea typeface="+mn-ea"/>
-                          <a:sym typeface="맑은 고딕"/>
-                        </a:rPr>
-                        <a:t>판매상태</a:t>
-                      </a:r>
-                      <a:r>
-                        <a:rPr lang="en-US" altLang="ko-KR" sz="800" b="0" dirty="0">
-                          <a:solidFill>
-                            <a:schemeClr val="tx1"/>
-                          </a:solidFill>
-                          <a:latin typeface="+mn-ea"/>
-                          <a:ea typeface="+mn-ea"/>
-                          <a:sym typeface="맑은 고딕"/>
-                        </a:rPr>
-                        <a:t>, </a:t>
-                      </a:r>
-                      <a:r>
-                        <a:rPr lang="ko-KR" altLang="en-US" sz="800" b="0" dirty="0">
-                          <a:solidFill>
-                            <a:schemeClr val="tx1"/>
-                          </a:solidFill>
-                          <a:latin typeface="+mn-ea"/>
-                          <a:ea typeface="+mn-ea"/>
-                          <a:sym typeface="맑은 고딕"/>
-                        </a:rPr>
-                        <a:t>작성자 표출</a:t>
-                      </a:r>
-                      <a:endParaRPr lang="en-US" altLang="ko-KR" sz="800" b="0" dirty="0">
-                        <a:solidFill>
-                          <a:schemeClr val="tx1"/>
-                        </a:solidFill>
-                        <a:latin typeface="+mn-ea"/>
-                        <a:ea typeface="+mn-ea"/>
-                        <a:sym typeface="맑은 고딕"/>
-                      </a:endParaRPr>
-                    </a:p>
-                  </a:txBody>
-                  <a:tcPr anchor="ctr">
-                    <a:lnL w="3175" cap="flat" cmpd="sng" algn="ctr">
-                      <a:noFill/>
-                      <a:prstDash val="solid"/>
-                      <a:round/>
-                      <a:headEnd type="none" w="med" len="med"/>
-                      <a:tailEnd type="none" w="med" len="med"/>
-                    </a:lnL>
-                    <a:lnR w="3175" cap="flat" cmpd="sng" algn="ctr">
-                      <a:noFill/>
-                      <a:prstDash val="solid"/>
-                      <a:round/>
-                      <a:headEnd type="none" w="med" len="med"/>
-                      <a:tailEnd type="none" w="med" len="med"/>
-                    </a:lnR>
-                    <a:lnT w="3175" cap="flat" cmpd="sng" algn="ctr">
-                      <a:solidFill>
-                        <a:schemeClr val="bg1">
-                          <a:lumMod val="65000"/>
-                        </a:schemeClr>
-                      </a:solidFill>
-                      <a:prstDash val="solid"/>
-                      <a:round/>
-                      <a:headEnd type="none" w="med" len="med"/>
-                      <a:tailEnd type="none" w="med" len="med"/>
-                    </a:lnT>
-                    <a:lnB w="3175" cap="flat" cmpd="sng" algn="ctr">
-                      <a:solidFill>
-                        <a:schemeClr val="tx1">
-                          <a:lumMod val="50000"/>
-                          <a:lumOff val="50000"/>
-                        </a:schemeClr>
-                      </a:solidFill>
-                      <a:prstDash val="solid"/>
-                      <a:round/>
-                      <a:headEnd type="none" w="med" len="med"/>
-                      <a:tailEnd type="none" w="med" len="med"/>
-                    </a:lnB>
-                    <a:noFill/>
-                  </a:tcPr>
-                </a:tc>
-                <a:tc hMerge="1">
-                  <a:txBody>
-                    <a:bodyPr/>
-                    <a:lstStyle/>
-                    <a:p>
-                      <a:pPr latinLnBrk="1"/>
-                      <a:endParaRPr lang="ko-KR" altLang="en-US"/>
-                    </a:p>
-                  </a:txBody>
-                  <a:tcPr/>
-                </a:tc>
-                <a:extLst>
-                  <a:ext uri="{0D108BD9-81ED-4DB2-BD59-A6C34878D82A}">
-                    <a16:rowId xmlns:a16="http://schemas.microsoft.com/office/drawing/2014/main" val="3072083066"/>
-                  </a:ext>
-                </a:extLst>
-              </a:tr>
-              <a:tr h="322995">
-                <a:tc>
-                  <a:txBody>
-                    <a:bodyPr/>
-                    <a:lstStyle/>
-                    <a:p>
-                      <a:pPr algn="ctr" latinLnBrk="1">
-                        <a:lnSpc>
-                          <a:spcPct val="120000"/>
-                        </a:lnSpc>
-                      </a:pPr>
-                      <a:r>
-                        <a:rPr lang="en-US" altLang="ko-KR" sz="850" b="0" dirty="0">
-                          <a:solidFill>
-                            <a:schemeClr val="tx1"/>
-                          </a:solidFill>
-                          <a:latin typeface="+mn-ea"/>
-                          <a:ea typeface="+mn-ea"/>
-                        </a:rPr>
-                        <a:t>1</a:t>
-                      </a:r>
-                      <a:endParaRPr lang="ko-KR" altLang="en-US" sz="850" b="0" dirty="0">
-                        <a:solidFill>
-                          <a:schemeClr val="tx1"/>
-                        </a:solidFill>
-                        <a:latin typeface="+mn-ea"/>
-                        <a:ea typeface="+mn-ea"/>
-                      </a:endParaRPr>
-                    </a:p>
-                  </a:txBody>
-                  <a:tcPr anchor="ctr">
-                    <a:lnL w="3175" cap="flat" cmpd="sng" algn="ctr">
-                      <a:noFill/>
-                      <a:prstDash val="solid"/>
-                      <a:round/>
-                      <a:headEnd type="none" w="med" len="med"/>
-                      <a:tailEnd type="none" w="med" len="med"/>
-                    </a:lnL>
-                    <a:lnR w="3175" cap="flat" cmpd="sng" algn="ctr">
-                      <a:solidFill>
-                        <a:schemeClr val="tx1">
-                          <a:lumMod val="50000"/>
-                          <a:lumOff val="50000"/>
-                        </a:schemeClr>
-                      </a:solidFill>
-                      <a:prstDash val="solid"/>
-                      <a:round/>
-                      <a:headEnd type="none" w="med" len="med"/>
-                      <a:tailEnd type="none" w="med" len="med"/>
-                    </a:lnR>
-                    <a:lnT w="3175" cap="flat" cmpd="sng" algn="ctr">
-                      <a:solidFill>
-                        <a:schemeClr val="tx1">
-                          <a:lumMod val="50000"/>
-                          <a:lumOff val="50000"/>
-                        </a:schemeClr>
-                      </a:solidFill>
-                      <a:prstDash val="solid"/>
-                      <a:round/>
-                      <a:headEnd type="none" w="med" len="med"/>
-                      <a:tailEnd type="none" w="med" len="med"/>
-                    </a:lnT>
-                    <a:lnB w="3175" cap="flat" cmpd="sng" algn="ctr">
-                      <a:solidFill>
-                        <a:schemeClr val="tx1">
-                          <a:lumMod val="50000"/>
-                          <a:lumOff val="50000"/>
-                        </a:schemeClr>
-                      </a:solidFill>
-                      <a:prstDash val="solid"/>
-                      <a:round/>
-                      <a:headEnd type="none" w="med" len="med"/>
-                      <a:tailEnd type="none" w="med" len="med"/>
-                    </a:lnB>
-                    <a:noFill/>
-                  </a:tcPr>
-                </a:tc>
-                <a:tc>
-                  <a:txBody>
-                    <a:bodyPr/>
-                    <a:lstStyle/>
-                    <a:p>
-                      <a:pPr algn="just" latinLnBrk="1">
-                        <a:lnSpc>
-                          <a:spcPct val="120000"/>
-                        </a:lnSpc>
-                      </a:pPr>
-                      <a:r>
-                        <a:rPr lang="en-US" altLang="ko-KR" sz="850" b="0" dirty="0">
-                          <a:latin typeface="+mn-ea"/>
-                          <a:ea typeface="+mn-ea"/>
-                        </a:rPr>
-                        <a:t>Nav bar</a:t>
-                      </a:r>
-                      <a:endParaRPr lang="ko-KR" altLang="en-US" sz="850" b="0" dirty="0">
-                        <a:latin typeface="+mn-ea"/>
-                        <a:ea typeface="+mn-ea"/>
-                      </a:endParaRPr>
-                    </a:p>
-                  </a:txBody>
-                  <a:tcPr anchor="ctr">
-                    <a:lnL w="3175" cap="flat" cmpd="sng" algn="ctr">
-                      <a:solidFill>
-                        <a:schemeClr val="tx1">
-                          <a:lumMod val="50000"/>
-                          <a:lumOff val="50000"/>
-                        </a:schemeClr>
-                      </a:solidFill>
-                      <a:prstDash val="solid"/>
-                      <a:round/>
-                      <a:headEnd type="none" w="med" len="med"/>
-                      <a:tailEnd type="none" w="med" len="med"/>
-                    </a:lnL>
-                    <a:lnR w="3175" cap="flat" cmpd="sng" algn="ctr">
-                      <a:noFill/>
-                      <a:prstDash val="solid"/>
-                      <a:round/>
-                      <a:headEnd type="none" w="med" len="med"/>
-                      <a:tailEnd type="none" w="med" len="med"/>
-                    </a:lnR>
-                    <a:lnT w="3175" cap="flat" cmpd="sng" algn="ctr">
-                      <a:solidFill>
-                        <a:schemeClr val="tx1">
-                          <a:lumMod val="50000"/>
-                          <a:lumOff val="50000"/>
-                        </a:schemeClr>
-                      </a:solidFill>
-                      <a:prstDash val="solid"/>
-                      <a:round/>
-                      <a:headEnd type="none" w="med" len="med"/>
-                      <a:tailEnd type="none" w="med" len="med"/>
-                    </a:lnT>
-                    <a:lnB w="3175" cap="flat" cmpd="sng" algn="ctr">
-                      <a:solidFill>
-                        <a:schemeClr val="tx1">
-                          <a:lumMod val="50000"/>
-                          <a:lumOff val="50000"/>
-                        </a:schemeClr>
-                      </a:solidFill>
-                      <a:prstDash val="solid"/>
-                      <a:round/>
-                      <a:headEnd type="none" w="med" len="med"/>
-                      <a:tailEnd type="none" w="med" len="med"/>
-                    </a:lnB>
-                    <a:noFill/>
-                  </a:tcPr>
-                </a:tc>
-                <a:extLst>
-                  <a:ext uri="{0D108BD9-81ED-4DB2-BD59-A6C34878D82A}">
-                    <a16:rowId xmlns:a16="http://schemas.microsoft.com/office/drawing/2014/main" val="896699591"/>
-                  </a:ext>
-                </a:extLst>
-              </a:tr>
-              <a:tr h="241592">
-                <a:tc>
-                  <a:txBody>
-                    <a:bodyPr/>
-                    <a:lstStyle/>
-                    <a:p>
-                      <a:pPr algn="ctr" latinLnBrk="1">
-                        <a:lnSpc>
-                          <a:spcPct val="120000"/>
-                        </a:lnSpc>
-                      </a:pPr>
-                      <a:r>
-                        <a:rPr lang="en-US" altLang="ko-KR" sz="850" b="0" dirty="0">
-                          <a:latin typeface="+mn-ea"/>
-                          <a:ea typeface="+mn-ea"/>
-                        </a:rPr>
-                        <a:t>2</a:t>
-                      </a:r>
-                      <a:endParaRPr lang="ko-KR" altLang="en-US" sz="850" b="0" dirty="0">
-                        <a:latin typeface="+mn-ea"/>
-                        <a:ea typeface="+mn-ea"/>
-                      </a:endParaRPr>
-                    </a:p>
-                  </a:txBody>
-                  <a:tcPr anchor="ctr">
-                    <a:lnL w="3175" cap="flat" cmpd="sng" algn="ctr">
-                      <a:noFill/>
-                      <a:prstDash val="solid"/>
-                      <a:round/>
-                      <a:headEnd type="none" w="med" len="med"/>
-                      <a:tailEnd type="none" w="med" len="med"/>
-                    </a:lnL>
-                    <a:lnR w="3175" cap="flat" cmpd="sng" algn="ctr">
-                      <a:solidFill>
-                        <a:schemeClr val="tx1">
-                          <a:lumMod val="50000"/>
-                          <a:lumOff val="50000"/>
-                        </a:schemeClr>
-                      </a:solidFill>
-                      <a:prstDash val="solid"/>
-                      <a:round/>
-                      <a:headEnd type="none" w="med" len="med"/>
-                      <a:tailEnd type="none" w="med" len="med"/>
-                    </a:lnR>
-                    <a:lnT w="3175" cap="flat" cmpd="sng" algn="ctr">
-                      <a:solidFill>
-                        <a:schemeClr val="tx1">
-                          <a:lumMod val="50000"/>
-                          <a:lumOff val="50000"/>
-                        </a:schemeClr>
-                      </a:solidFill>
-                      <a:prstDash val="solid"/>
-                      <a:round/>
-                      <a:headEnd type="none" w="med" len="med"/>
-                      <a:tailEnd type="none" w="med" len="med"/>
-                    </a:lnT>
-                    <a:lnB w="3175" cap="flat" cmpd="sng" algn="ctr">
-                      <a:solidFill>
-                        <a:schemeClr val="tx1">
-                          <a:lumMod val="50000"/>
-                          <a:lumOff val="50000"/>
-                        </a:schemeClr>
-                      </a:solidFill>
-                      <a:prstDash val="solid"/>
-                      <a:round/>
-                      <a:headEnd type="none" w="med" len="med"/>
-                      <a:tailEnd type="none" w="med" len="med"/>
-                    </a:lnB>
-                    <a:noFill/>
-                  </a:tcPr>
-                </a:tc>
-                <a:tc>
-                  <a:txBody>
-                    <a:bodyPr/>
-                    <a:lstStyle/>
-                    <a:p>
-                      <a:pPr marL="0" marR="0" lvl="0" indent="0" algn="just" defTabSz="914400" rtl="0" eaLnBrk="1" fontAlgn="auto" latinLnBrk="1" hangingPunct="1">
-                        <a:lnSpc>
-                          <a:spcPct val="120000"/>
-                        </a:lnSpc>
-                        <a:spcBef>
-                          <a:spcPts val="0"/>
-                        </a:spcBef>
-                        <a:spcAft>
-                          <a:spcPts val="0"/>
-                        </a:spcAft>
-                        <a:buClrTx/>
-                        <a:buSzTx/>
-                        <a:buFontTx/>
-                        <a:buNone/>
-                        <a:tabLst/>
-                        <a:defRPr/>
-                      </a:pPr>
-                      <a:r>
-                        <a:rPr kumimoji="1" lang="ko-KR" altLang="en-US" sz="850" dirty="0" err="1">
-                          <a:solidFill>
-                            <a:schemeClr val="tx1"/>
-                          </a:solidFill>
-                          <a:latin typeface="+mn-ea"/>
-                        </a:rPr>
-                        <a:t>판매글</a:t>
-                      </a:r>
-                      <a:r>
-                        <a:rPr kumimoji="1" lang="ko-KR" altLang="en-US" sz="850" dirty="0">
-                          <a:solidFill>
-                            <a:schemeClr val="tx1"/>
-                          </a:solidFill>
-                          <a:latin typeface="+mn-ea"/>
-                        </a:rPr>
-                        <a:t> 목록 </a:t>
-                      </a:r>
-                      <a:r>
-                        <a:rPr kumimoji="1" lang="en-US" altLang="ko-KR" sz="850" dirty="0">
-                          <a:solidFill>
-                            <a:schemeClr val="tx1"/>
-                          </a:solidFill>
-                          <a:latin typeface="+mn-ea"/>
-                        </a:rPr>
-                        <a:t>(title, price, </a:t>
-                      </a:r>
-                      <a:r>
-                        <a:rPr kumimoji="1" lang="en-US" altLang="ko-KR" sz="850" dirty="0" err="1">
-                          <a:solidFill>
-                            <a:schemeClr val="tx1"/>
-                          </a:solidFill>
-                          <a:latin typeface="+mn-ea"/>
-                        </a:rPr>
-                        <a:t>statuss</a:t>
-                      </a:r>
-                      <a:r>
-                        <a:rPr kumimoji="1" lang="en-US" altLang="ko-KR" sz="850" dirty="0">
-                          <a:solidFill>
-                            <a:schemeClr val="tx1"/>
-                          </a:solidFill>
-                          <a:latin typeface="+mn-ea"/>
-                        </a:rPr>
-                        <a:t>, writer)</a:t>
-                      </a:r>
-                      <a:endParaRPr kumimoji="1" lang="ko-KR" altLang="en-US" sz="850" dirty="0">
-                        <a:solidFill>
-                          <a:schemeClr val="tx1"/>
-                        </a:solidFill>
-                        <a:latin typeface="+mn-ea"/>
-                      </a:endParaRPr>
-                    </a:p>
-                  </a:txBody>
-                  <a:tcPr anchor="ctr">
-                    <a:lnL w="3175" cap="flat" cmpd="sng" algn="ctr">
-                      <a:solidFill>
-                        <a:schemeClr val="tx1">
-                          <a:lumMod val="50000"/>
-                          <a:lumOff val="50000"/>
-                        </a:schemeClr>
-                      </a:solidFill>
-                      <a:prstDash val="solid"/>
-                      <a:round/>
-                      <a:headEnd type="none" w="med" len="med"/>
-                      <a:tailEnd type="none" w="med" len="med"/>
-                    </a:lnL>
-                    <a:lnR w="3175" cap="flat" cmpd="sng" algn="ctr">
-                      <a:noFill/>
-                      <a:prstDash val="solid"/>
-                      <a:round/>
-                      <a:headEnd type="none" w="med" len="med"/>
-                      <a:tailEnd type="none" w="med" len="med"/>
-                    </a:lnR>
-                    <a:lnT w="3175" cap="flat" cmpd="sng" algn="ctr">
-                      <a:solidFill>
-                        <a:schemeClr val="tx1">
-                          <a:lumMod val="50000"/>
-                          <a:lumOff val="50000"/>
-                        </a:schemeClr>
-                      </a:solidFill>
-                      <a:prstDash val="solid"/>
-                      <a:round/>
-                      <a:headEnd type="none" w="med" len="med"/>
-                      <a:tailEnd type="none" w="med" len="med"/>
-                    </a:lnT>
-                    <a:lnB w="3175" cap="flat" cmpd="sng" algn="ctr">
-                      <a:solidFill>
-                        <a:schemeClr val="tx1">
-                          <a:lumMod val="50000"/>
-                          <a:lumOff val="50000"/>
-                        </a:schemeClr>
-                      </a:solidFill>
-                      <a:prstDash val="solid"/>
-                      <a:round/>
-                      <a:headEnd type="none" w="med" len="med"/>
-                      <a:tailEnd type="none" w="med" len="med"/>
-                    </a:lnB>
-                    <a:noFill/>
-                  </a:tcPr>
-                </a:tc>
-                <a:extLst>
-                  <a:ext uri="{0D108BD9-81ED-4DB2-BD59-A6C34878D82A}">
-                    <a16:rowId xmlns:a16="http://schemas.microsoft.com/office/drawing/2014/main" val="2972133637"/>
-                  </a:ext>
-                </a:extLst>
-              </a:tr>
-              <a:tr h="241592">
-                <a:tc>
-                  <a:txBody>
-                    <a:bodyPr/>
-                    <a:lstStyle/>
-                    <a:p>
-                      <a:pPr algn="ctr" latinLnBrk="1">
-                        <a:lnSpc>
-                          <a:spcPct val="120000"/>
-                        </a:lnSpc>
-                      </a:pPr>
-                      <a:r>
-                        <a:rPr lang="en-US" altLang="ko-KR" sz="850" b="0" dirty="0">
-                          <a:latin typeface="+mn-ea"/>
-                          <a:ea typeface="+mn-ea"/>
-                        </a:rPr>
-                        <a:t>3</a:t>
-                      </a:r>
-                      <a:endParaRPr lang="ko-KR" altLang="en-US" sz="850" b="0" dirty="0">
-                        <a:latin typeface="+mn-ea"/>
-                        <a:ea typeface="+mn-ea"/>
-                      </a:endParaRPr>
-                    </a:p>
-                  </a:txBody>
-                  <a:tcPr anchor="ctr">
-                    <a:lnL w="3175" cap="flat" cmpd="sng" algn="ctr">
-                      <a:noFill/>
-                      <a:prstDash val="solid"/>
-                      <a:round/>
-                      <a:headEnd type="none" w="med" len="med"/>
-                      <a:tailEnd type="none" w="med" len="med"/>
-                    </a:lnL>
-                    <a:lnR w="3175" cap="flat" cmpd="sng" algn="ctr">
-                      <a:solidFill>
-                        <a:schemeClr val="tx1">
-                          <a:lumMod val="50000"/>
-                          <a:lumOff val="50000"/>
-                        </a:schemeClr>
-                      </a:solidFill>
-                      <a:prstDash val="solid"/>
-                      <a:round/>
-                      <a:headEnd type="none" w="med" len="med"/>
-                      <a:tailEnd type="none" w="med" len="med"/>
-                    </a:lnR>
-                    <a:lnT w="3175" cap="flat" cmpd="sng" algn="ctr">
-                      <a:solidFill>
-                        <a:schemeClr val="tx1">
-                          <a:lumMod val="50000"/>
-                          <a:lumOff val="50000"/>
-                        </a:schemeClr>
-                      </a:solidFill>
-                      <a:prstDash val="solid"/>
-                      <a:round/>
-                      <a:headEnd type="none" w="med" len="med"/>
-                      <a:tailEnd type="none" w="med" len="med"/>
-                    </a:lnT>
-                    <a:lnB w="3175" cap="flat" cmpd="sng" algn="ctr">
-                      <a:solidFill>
-                        <a:schemeClr val="tx1">
-                          <a:lumMod val="50000"/>
-                          <a:lumOff val="50000"/>
-                        </a:schemeClr>
-                      </a:solidFill>
-                      <a:prstDash val="solid"/>
-                      <a:round/>
-                      <a:headEnd type="none" w="med" len="med"/>
-                      <a:tailEnd type="none" w="med" len="med"/>
-                    </a:lnB>
-                    <a:noFill/>
-                  </a:tcPr>
-                </a:tc>
-                <a:tc>
-                  <a:txBody>
-                    <a:bodyPr/>
-                    <a:lstStyle/>
-                    <a:p>
-                      <a:pPr marL="0" marR="0" lvl="0" indent="0" algn="just" defTabSz="914400" rtl="0" eaLnBrk="1" fontAlgn="auto" latinLnBrk="1" hangingPunct="1">
-                        <a:lnSpc>
-                          <a:spcPct val="120000"/>
-                        </a:lnSpc>
-                        <a:spcBef>
-                          <a:spcPts val="0"/>
-                        </a:spcBef>
-                        <a:spcAft>
-                          <a:spcPts val="0"/>
-                        </a:spcAft>
-                        <a:buClrTx/>
-                        <a:buSzTx/>
-                        <a:buFontTx/>
-                        <a:buNone/>
-                        <a:tabLst/>
-                        <a:defRPr/>
-                      </a:pPr>
-                      <a:r>
-                        <a:rPr kumimoji="1" lang="ko-KR" altLang="en-US" sz="850" dirty="0">
-                          <a:solidFill>
-                            <a:schemeClr val="tx1"/>
-                          </a:solidFill>
-                          <a:latin typeface="+mn-ea"/>
-                        </a:rPr>
-                        <a:t>카테고리 선택에 따른 게시글 필터 처리</a:t>
-                      </a:r>
-                    </a:p>
-                  </a:txBody>
-                  <a:tcPr anchor="ctr">
-                    <a:lnL w="3175" cap="flat" cmpd="sng" algn="ctr">
-                      <a:solidFill>
-                        <a:schemeClr val="tx1">
-                          <a:lumMod val="50000"/>
-                          <a:lumOff val="50000"/>
-                        </a:schemeClr>
-                      </a:solidFill>
-                      <a:prstDash val="solid"/>
-                      <a:round/>
-                      <a:headEnd type="none" w="med" len="med"/>
-                      <a:tailEnd type="none" w="med" len="med"/>
-                    </a:lnL>
-                    <a:lnR w="3175" cap="flat" cmpd="sng" algn="ctr">
-                      <a:noFill/>
-                      <a:prstDash val="solid"/>
-                      <a:round/>
-                      <a:headEnd type="none" w="med" len="med"/>
-                      <a:tailEnd type="none" w="med" len="med"/>
-                    </a:lnR>
-                    <a:lnT w="3175" cap="flat" cmpd="sng" algn="ctr">
-                      <a:solidFill>
-                        <a:schemeClr val="tx1">
-                          <a:lumMod val="50000"/>
-                          <a:lumOff val="50000"/>
-                        </a:schemeClr>
-                      </a:solidFill>
-                      <a:prstDash val="solid"/>
-                      <a:round/>
-                      <a:headEnd type="none" w="med" len="med"/>
-                      <a:tailEnd type="none" w="med" len="med"/>
-                    </a:lnT>
-                    <a:lnB w="3175" cap="flat" cmpd="sng" algn="ctr">
-                      <a:solidFill>
-                        <a:schemeClr val="tx1">
-                          <a:lumMod val="50000"/>
-                          <a:lumOff val="50000"/>
-                        </a:schemeClr>
-                      </a:solidFill>
-                      <a:prstDash val="solid"/>
-                      <a:round/>
-                      <a:headEnd type="none" w="med" len="med"/>
-                      <a:tailEnd type="none" w="med" len="med"/>
-                    </a:lnB>
-                    <a:noFill/>
-                  </a:tcPr>
-                </a:tc>
-                <a:extLst>
-                  <a:ext uri="{0D108BD9-81ED-4DB2-BD59-A6C34878D82A}">
-                    <a16:rowId xmlns:a16="http://schemas.microsoft.com/office/drawing/2014/main" val="2075783758"/>
-                  </a:ext>
-                </a:extLst>
-              </a:tr>
-              <a:tr h="241592">
-                <a:tc>
-                  <a:txBody>
-                    <a:bodyPr/>
-                    <a:lstStyle/>
-                    <a:p>
-                      <a:pPr algn="ctr" latinLnBrk="1">
-                        <a:lnSpc>
-                          <a:spcPct val="120000"/>
-                        </a:lnSpc>
-                      </a:pPr>
-                      <a:r>
-                        <a:rPr lang="en-US" altLang="ko-KR" sz="850" b="0" dirty="0">
-                          <a:latin typeface="+mn-ea"/>
-                          <a:ea typeface="+mn-ea"/>
-                        </a:rPr>
-                        <a:t>4</a:t>
-                      </a:r>
-                      <a:endParaRPr lang="ko-KR" altLang="en-US" sz="850" b="0" dirty="0">
-                        <a:latin typeface="+mn-ea"/>
-                        <a:ea typeface="+mn-ea"/>
-                      </a:endParaRPr>
-                    </a:p>
-                  </a:txBody>
-                  <a:tcPr anchor="ctr">
-                    <a:lnL w="3175" cap="flat" cmpd="sng" algn="ctr">
-                      <a:noFill/>
-                      <a:prstDash val="solid"/>
-                      <a:round/>
-                      <a:headEnd type="none" w="med" len="med"/>
-                      <a:tailEnd type="none" w="med" len="med"/>
-                    </a:lnL>
-                    <a:lnR w="3175" cap="flat" cmpd="sng" algn="ctr">
-                      <a:solidFill>
-                        <a:schemeClr val="tx1">
-                          <a:lumMod val="50000"/>
-                          <a:lumOff val="50000"/>
-                        </a:schemeClr>
-                      </a:solidFill>
-                      <a:prstDash val="solid"/>
-                      <a:round/>
-                      <a:headEnd type="none" w="med" len="med"/>
-                      <a:tailEnd type="none" w="med" len="med"/>
-                    </a:lnR>
-                    <a:lnT w="3175" cap="flat" cmpd="sng" algn="ctr">
-                      <a:solidFill>
-                        <a:schemeClr val="tx1">
-                          <a:lumMod val="50000"/>
-                          <a:lumOff val="50000"/>
-                        </a:schemeClr>
-                      </a:solidFill>
-                      <a:prstDash val="solid"/>
-                      <a:round/>
-                      <a:headEnd type="none" w="med" len="med"/>
-                      <a:tailEnd type="none" w="med" len="med"/>
-                    </a:lnT>
-                    <a:lnB w="3175" cap="flat" cmpd="sng" algn="ctr">
-                      <a:solidFill>
-                        <a:schemeClr val="tx1">
-                          <a:lumMod val="50000"/>
-                          <a:lumOff val="50000"/>
-                        </a:schemeClr>
-                      </a:solidFill>
-                      <a:prstDash val="solid"/>
-                      <a:round/>
-                      <a:headEnd type="none" w="med" len="med"/>
-                      <a:tailEnd type="none" w="med" len="med"/>
-                    </a:lnB>
-                    <a:noFill/>
-                  </a:tcPr>
-                </a:tc>
-                <a:tc>
-                  <a:txBody>
-                    <a:bodyPr/>
-                    <a:lstStyle/>
-                    <a:p>
-                      <a:pPr marL="0" marR="0" lvl="0" indent="0" algn="just" defTabSz="914400" rtl="0" eaLnBrk="1" fontAlgn="auto" latinLnBrk="1" hangingPunct="1">
-                        <a:lnSpc>
-                          <a:spcPct val="120000"/>
-                        </a:lnSpc>
-                        <a:spcBef>
-                          <a:spcPts val="0"/>
-                        </a:spcBef>
-                        <a:spcAft>
-                          <a:spcPts val="0"/>
-                        </a:spcAft>
-                        <a:buClrTx/>
-                        <a:buSzTx/>
-                        <a:buFontTx/>
-                        <a:buNone/>
-                        <a:tabLst/>
-                        <a:defRPr/>
-                      </a:pPr>
-                      <a:r>
-                        <a:rPr kumimoji="1" lang="ko-KR" altLang="en-US" sz="850" dirty="0">
-                          <a:solidFill>
-                            <a:schemeClr val="tx1"/>
-                          </a:solidFill>
-                          <a:latin typeface="+mn-ea"/>
-                        </a:rPr>
-                        <a:t>게시글 목록 </a:t>
-                      </a:r>
-                      <a:r>
-                        <a:rPr kumimoji="1" lang="en-US" altLang="ko-KR" sz="850" dirty="0">
-                          <a:solidFill>
-                            <a:schemeClr val="tx1"/>
-                          </a:solidFill>
-                          <a:latin typeface="+mn-ea"/>
-                        </a:rPr>
-                        <a:t>10</a:t>
-                      </a:r>
-                      <a:r>
-                        <a:rPr kumimoji="1" lang="ko-KR" altLang="en-US" sz="850" dirty="0">
-                          <a:solidFill>
-                            <a:schemeClr val="tx1"/>
-                          </a:solidFill>
-                          <a:latin typeface="+mn-ea"/>
-                        </a:rPr>
-                        <a:t>개 단위로 </a:t>
-                      </a:r>
-                      <a:r>
-                        <a:rPr kumimoji="1" lang="ko-KR" altLang="en-US" sz="850" dirty="0" err="1">
-                          <a:solidFill>
-                            <a:schemeClr val="tx1"/>
-                          </a:solidFill>
-                          <a:latin typeface="+mn-ea"/>
-                        </a:rPr>
-                        <a:t>페이징</a:t>
-                      </a:r>
-                      <a:r>
-                        <a:rPr kumimoji="1" lang="ko-KR" altLang="en-US" sz="850" dirty="0">
-                          <a:solidFill>
-                            <a:schemeClr val="tx1"/>
-                          </a:solidFill>
-                          <a:latin typeface="+mn-ea"/>
-                        </a:rPr>
-                        <a:t> 처리</a:t>
-                      </a:r>
-                      <a:endParaRPr kumimoji="1" lang="en-US" altLang="ko-KR" sz="850" dirty="0">
-                        <a:solidFill>
-                          <a:schemeClr val="tx1"/>
-                        </a:solidFill>
-                        <a:latin typeface="+mn-ea"/>
-                      </a:endParaRPr>
-                    </a:p>
-                  </a:txBody>
-                  <a:tcPr anchor="ctr">
-                    <a:lnL w="3175" cap="flat" cmpd="sng" algn="ctr">
-                      <a:solidFill>
-                        <a:schemeClr val="tx1">
-                          <a:lumMod val="50000"/>
-                          <a:lumOff val="50000"/>
-                        </a:schemeClr>
-                      </a:solidFill>
-                      <a:prstDash val="solid"/>
-                      <a:round/>
-                      <a:headEnd type="none" w="med" len="med"/>
-                      <a:tailEnd type="none" w="med" len="med"/>
-                    </a:lnL>
-                    <a:lnR w="3175" cap="flat" cmpd="sng" algn="ctr">
-                      <a:noFill/>
-                      <a:prstDash val="solid"/>
-                      <a:round/>
-                      <a:headEnd type="none" w="med" len="med"/>
-                      <a:tailEnd type="none" w="med" len="med"/>
-                    </a:lnR>
-                    <a:lnT w="3175" cap="flat" cmpd="sng" algn="ctr">
-                      <a:solidFill>
-                        <a:schemeClr val="tx1">
-                          <a:lumMod val="50000"/>
-                          <a:lumOff val="50000"/>
-                        </a:schemeClr>
-                      </a:solidFill>
-                      <a:prstDash val="solid"/>
-                      <a:round/>
-                      <a:headEnd type="none" w="med" len="med"/>
-                      <a:tailEnd type="none" w="med" len="med"/>
-                    </a:lnT>
-                    <a:lnB w="3175" cap="flat" cmpd="sng" algn="ctr">
-                      <a:solidFill>
-                        <a:schemeClr val="tx1">
-                          <a:lumMod val="50000"/>
-                          <a:lumOff val="50000"/>
-                        </a:schemeClr>
-                      </a:solidFill>
-                      <a:prstDash val="solid"/>
-                      <a:round/>
-                      <a:headEnd type="none" w="med" len="med"/>
-                      <a:tailEnd type="none" w="med" len="med"/>
-                    </a:lnB>
-                    <a:noFill/>
-                  </a:tcPr>
-                </a:tc>
-                <a:extLst>
-                  <a:ext uri="{0D108BD9-81ED-4DB2-BD59-A6C34878D82A}">
-                    <a16:rowId xmlns:a16="http://schemas.microsoft.com/office/drawing/2014/main" val="1068123190"/>
-                  </a:ext>
-                </a:extLst>
-              </a:tr>
-              <a:tr h="241592">
-                <a:tc>
-                  <a:txBody>
-                    <a:bodyPr/>
-                    <a:lstStyle/>
-                    <a:p>
-                      <a:pPr algn="ctr" latinLnBrk="1">
-                        <a:lnSpc>
-                          <a:spcPct val="120000"/>
-                        </a:lnSpc>
-                      </a:pPr>
-                      <a:r>
-                        <a:rPr lang="en-US" altLang="ko-KR" sz="850" b="0" dirty="0">
-                          <a:latin typeface="+mn-ea"/>
-                          <a:ea typeface="+mn-ea"/>
-                        </a:rPr>
-                        <a:t>5</a:t>
-                      </a:r>
-                      <a:endParaRPr lang="ko-KR" altLang="en-US" sz="850" b="0" dirty="0">
-                        <a:latin typeface="+mn-ea"/>
-                        <a:ea typeface="+mn-ea"/>
-                      </a:endParaRPr>
-                    </a:p>
-                  </a:txBody>
-                  <a:tcPr anchor="ctr">
-                    <a:lnL w="3175" cap="flat" cmpd="sng" algn="ctr">
-                      <a:noFill/>
-                      <a:prstDash val="solid"/>
-                      <a:round/>
-                      <a:headEnd type="none" w="med" len="med"/>
-                      <a:tailEnd type="none" w="med" len="med"/>
-                    </a:lnL>
-                    <a:lnR w="3175" cap="flat" cmpd="sng" algn="ctr">
-                      <a:solidFill>
-                        <a:schemeClr val="tx1">
-                          <a:lumMod val="50000"/>
-                          <a:lumOff val="50000"/>
-                        </a:schemeClr>
-                      </a:solidFill>
-                      <a:prstDash val="solid"/>
-                      <a:round/>
-                      <a:headEnd type="none" w="med" len="med"/>
-                      <a:tailEnd type="none" w="med" len="med"/>
-                    </a:lnR>
-                    <a:lnT w="3175" cap="flat" cmpd="sng" algn="ctr">
-                      <a:solidFill>
-                        <a:schemeClr val="tx1">
-                          <a:lumMod val="50000"/>
-                          <a:lumOff val="50000"/>
-                        </a:schemeClr>
-                      </a:solidFill>
-                      <a:prstDash val="solid"/>
-                      <a:round/>
-                      <a:headEnd type="none" w="med" len="med"/>
-                      <a:tailEnd type="none" w="med" len="med"/>
-                    </a:lnT>
-                    <a:lnB w="3175" cap="flat" cmpd="sng" algn="ctr">
-                      <a:solidFill>
-                        <a:schemeClr val="tx1">
-                          <a:lumMod val="50000"/>
-                          <a:lumOff val="50000"/>
-                        </a:schemeClr>
-                      </a:solidFill>
-                      <a:prstDash val="solid"/>
-                      <a:round/>
-                      <a:headEnd type="none" w="med" len="med"/>
-                      <a:tailEnd type="none" w="med" len="med"/>
-                    </a:lnB>
-                    <a:noFill/>
-                  </a:tcPr>
-                </a:tc>
-                <a:tc>
-                  <a:txBody>
-                    <a:bodyPr/>
-                    <a:lstStyle/>
-                    <a:p>
-                      <a:pPr algn="just" latinLnBrk="1">
-                        <a:lnSpc>
-                          <a:spcPct val="120000"/>
-                        </a:lnSpc>
-                      </a:pPr>
-                      <a:r>
-                        <a:rPr lang="ko-KR" altLang="en-US" sz="850" b="0" dirty="0">
-                          <a:latin typeface="+mn-ea"/>
-                          <a:ea typeface="+mn-ea"/>
-                        </a:rPr>
-                        <a:t>타이틀 </a:t>
-                      </a:r>
-                      <a:r>
-                        <a:rPr lang="ko-KR" altLang="en-US" sz="850" b="0" dirty="0" err="1">
-                          <a:latin typeface="+mn-ea"/>
-                          <a:ea typeface="+mn-ea"/>
-                        </a:rPr>
-                        <a:t>검색바</a:t>
-                      </a:r>
-                      <a:endParaRPr lang="ko-KR" altLang="en-US" sz="850" b="0" dirty="0">
-                        <a:latin typeface="+mn-ea"/>
-                        <a:ea typeface="+mn-ea"/>
-                      </a:endParaRPr>
-                    </a:p>
-                  </a:txBody>
-                  <a:tcPr anchor="ctr">
-                    <a:lnL w="3175" cap="flat" cmpd="sng" algn="ctr">
-                      <a:solidFill>
-                        <a:schemeClr val="tx1">
-                          <a:lumMod val="50000"/>
-                          <a:lumOff val="50000"/>
-                        </a:schemeClr>
-                      </a:solidFill>
-                      <a:prstDash val="solid"/>
-                      <a:round/>
-                      <a:headEnd type="none" w="med" len="med"/>
-                      <a:tailEnd type="none" w="med" len="med"/>
-                    </a:lnL>
-                    <a:lnR w="3175" cap="flat" cmpd="sng" algn="ctr">
-                      <a:noFill/>
-                      <a:prstDash val="solid"/>
-                      <a:round/>
-                      <a:headEnd type="none" w="med" len="med"/>
-                      <a:tailEnd type="none" w="med" len="med"/>
-                    </a:lnR>
-                    <a:lnT w="3175" cap="flat" cmpd="sng" algn="ctr">
-                      <a:solidFill>
-                        <a:schemeClr val="tx1">
-                          <a:lumMod val="50000"/>
-                          <a:lumOff val="50000"/>
-                        </a:schemeClr>
-                      </a:solidFill>
-                      <a:prstDash val="solid"/>
-                      <a:round/>
-                      <a:headEnd type="none" w="med" len="med"/>
-                      <a:tailEnd type="none" w="med" len="med"/>
-                    </a:lnT>
-                    <a:lnB w="3175" cap="flat" cmpd="sng" algn="ctr">
-                      <a:solidFill>
-                        <a:schemeClr val="tx1">
-                          <a:lumMod val="50000"/>
-                          <a:lumOff val="50000"/>
-                        </a:schemeClr>
-                      </a:solidFill>
-                      <a:prstDash val="solid"/>
-                      <a:round/>
-                      <a:headEnd type="none" w="med" len="med"/>
-                      <a:tailEnd type="none" w="med" len="med"/>
-                    </a:lnB>
-                    <a:noFill/>
-                  </a:tcPr>
-                </a:tc>
-                <a:extLst>
-                  <a:ext uri="{0D108BD9-81ED-4DB2-BD59-A6C34878D82A}">
-                    <a16:rowId xmlns:a16="http://schemas.microsoft.com/office/drawing/2014/main" val="1494350657"/>
-                  </a:ext>
-                </a:extLst>
-              </a:tr>
-              <a:tr h="241592">
-                <a:tc>
-                  <a:txBody>
-                    <a:bodyPr/>
-                    <a:lstStyle/>
-                    <a:p>
-                      <a:pPr algn="ctr" latinLnBrk="1">
-                        <a:lnSpc>
-                          <a:spcPct val="120000"/>
-                        </a:lnSpc>
-                      </a:pPr>
-                      <a:r>
-                        <a:rPr lang="en-US" altLang="ko-KR" sz="850" b="0" dirty="0">
-                          <a:latin typeface="+mn-ea"/>
-                          <a:ea typeface="+mn-ea"/>
-                        </a:rPr>
-                        <a:t>6</a:t>
-                      </a:r>
-                      <a:endParaRPr lang="ko-KR" altLang="en-US" sz="850" b="0" dirty="0">
-                        <a:latin typeface="+mn-ea"/>
-                        <a:ea typeface="+mn-ea"/>
-                      </a:endParaRPr>
-                    </a:p>
-                  </a:txBody>
-                  <a:tcPr anchor="ctr">
-                    <a:lnL w="3175" cap="flat" cmpd="sng" algn="ctr">
-                      <a:noFill/>
-                      <a:prstDash val="solid"/>
-                      <a:round/>
-                      <a:headEnd type="none" w="med" len="med"/>
-                      <a:tailEnd type="none" w="med" len="med"/>
-                    </a:lnL>
-                    <a:lnR w="3175" cap="flat" cmpd="sng" algn="ctr">
-                      <a:solidFill>
-                        <a:schemeClr val="tx1">
-                          <a:lumMod val="50000"/>
-                          <a:lumOff val="50000"/>
-                        </a:schemeClr>
-                      </a:solidFill>
-                      <a:prstDash val="solid"/>
-                      <a:round/>
-                      <a:headEnd type="none" w="med" len="med"/>
-                      <a:tailEnd type="none" w="med" len="med"/>
-                    </a:lnR>
-                    <a:lnT w="3175" cap="flat" cmpd="sng" algn="ctr">
-                      <a:solidFill>
-                        <a:schemeClr val="tx1">
-                          <a:lumMod val="50000"/>
-                          <a:lumOff val="50000"/>
-                        </a:schemeClr>
-                      </a:solidFill>
-                      <a:prstDash val="solid"/>
-                      <a:round/>
-                      <a:headEnd type="none" w="med" len="med"/>
-                      <a:tailEnd type="none" w="med" len="med"/>
-                    </a:lnT>
-                    <a:lnB w="3175" cap="flat" cmpd="sng" algn="ctr">
-                      <a:solidFill>
-                        <a:schemeClr val="tx1">
-                          <a:lumMod val="50000"/>
-                          <a:lumOff val="50000"/>
-                        </a:schemeClr>
-                      </a:solidFill>
-                      <a:prstDash val="solid"/>
-                      <a:round/>
-                      <a:headEnd type="none" w="med" len="med"/>
-                      <a:tailEnd type="none" w="med" len="med"/>
-                    </a:lnB>
-                    <a:noFill/>
-                  </a:tcPr>
-                </a:tc>
-                <a:tc>
-                  <a:txBody>
-                    <a:bodyPr/>
-                    <a:lstStyle/>
-                    <a:p>
-                      <a:pPr marL="0" marR="0" lvl="0" indent="0" algn="just" defTabSz="914400" rtl="0" eaLnBrk="1" fontAlgn="auto" latinLnBrk="1" hangingPunct="1">
-                        <a:lnSpc>
-                          <a:spcPct val="120000"/>
-                        </a:lnSpc>
-                        <a:spcBef>
-                          <a:spcPts val="0"/>
-                        </a:spcBef>
-                        <a:spcAft>
-                          <a:spcPts val="0"/>
-                        </a:spcAft>
-                        <a:buClrTx/>
-                        <a:buSzTx/>
-                        <a:buFontTx/>
-                        <a:buNone/>
-                        <a:tabLst/>
-                        <a:defRPr/>
-                      </a:pPr>
-                      <a:endParaRPr kumimoji="1" lang="en-US" altLang="ko-KR" sz="850" dirty="0">
-                        <a:solidFill>
-                          <a:schemeClr val="tx1"/>
-                        </a:solidFill>
-                        <a:latin typeface="+mn-ea"/>
-                      </a:endParaRPr>
-                    </a:p>
-                  </a:txBody>
-                  <a:tcPr anchor="ctr">
-                    <a:lnL w="3175" cap="flat" cmpd="sng" algn="ctr">
-                      <a:solidFill>
-                        <a:schemeClr val="tx1">
-                          <a:lumMod val="50000"/>
-                          <a:lumOff val="50000"/>
-                        </a:schemeClr>
-                      </a:solidFill>
-                      <a:prstDash val="solid"/>
-                      <a:round/>
-                      <a:headEnd type="none" w="med" len="med"/>
-                      <a:tailEnd type="none" w="med" len="med"/>
-                    </a:lnL>
-                    <a:lnR w="3175" cap="flat" cmpd="sng" algn="ctr">
-                      <a:noFill/>
-                      <a:prstDash val="solid"/>
-                      <a:round/>
-                      <a:headEnd type="none" w="med" len="med"/>
-                      <a:tailEnd type="none" w="med" len="med"/>
-                    </a:lnR>
-                    <a:lnT w="3175" cap="flat" cmpd="sng" algn="ctr">
-                      <a:solidFill>
-                        <a:schemeClr val="tx1">
-                          <a:lumMod val="50000"/>
-                          <a:lumOff val="50000"/>
-                        </a:schemeClr>
-                      </a:solidFill>
-                      <a:prstDash val="solid"/>
-                      <a:round/>
-                      <a:headEnd type="none" w="med" len="med"/>
-                      <a:tailEnd type="none" w="med" len="med"/>
-                    </a:lnT>
-                    <a:lnB w="3175" cap="flat" cmpd="sng" algn="ctr">
-                      <a:solidFill>
-                        <a:schemeClr val="tx1">
-                          <a:lumMod val="50000"/>
-                          <a:lumOff val="50000"/>
-                        </a:schemeClr>
-                      </a:solidFill>
-                      <a:prstDash val="solid"/>
-                      <a:round/>
-                      <a:headEnd type="none" w="med" len="med"/>
-                      <a:tailEnd type="none" w="med" len="med"/>
-                    </a:lnB>
-                    <a:noFill/>
-                  </a:tcPr>
-                </a:tc>
-                <a:extLst>
-                  <a:ext uri="{0D108BD9-81ED-4DB2-BD59-A6C34878D82A}">
-                    <a16:rowId xmlns:a16="http://schemas.microsoft.com/office/drawing/2014/main" val="1839284551"/>
-                  </a:ext>
-                </a:extLst>
-              </a:tr>
-              <a:tr h="241592">
-                <a:tc>
-                  <a:txBody>
-                    <a:bodyPr/>
-                    <a:lstStyle/>
-                    <a:p>
-                      <a:pPr algn="ctr" latinLnBrk="1">
-                        <a:lnSpc>
-                          <a:spcPct val="120000"/>
-                        </a:lnSpc>
-                      </a:pPr>
-                      <a:r>
-                        <a:rPr lang="en-US" altLang="ko-KR" sz="850" b="0" dirty="0">
-                          <a:latin typeface="+mn-ea"/>
-                          <a:ea typeface="+mn-ea"/>
-                        </a:rPr>
-                        <a:t>7</a:t>
-                      </a:r>
-                      <a:endParaRPr lang="ko-KR" altLang="en-US" sz="850" b="0" dirty="0">
-                        <a:latin typeface="+mn-ea"/>
-                        <a:ea typeface="+mn-ea"/>
-                      </a:endParaRPr>
-                    </a:p>
-                  </a:txBody>
-                  <a:tcPr anchor="ctr">
-                    <a:lnL w="3175" cap="flat" cmpd="sng" algn="ctr">
-                      <a:noFill/>
-                      <a:prstDash val="solid"/>
-                      <a:round/>
-                      <a:headEnd type="none" w="med" len="med"/>
-                      <a:tailEnd type="none" w="med" len="med"/>
-                    </a:lnL>
-                    <a:lnR w="3175" cap="flat" cmpd="sng" algn="ctr">
-                      <a:solidFill>
-                        <a:schemeClr val="tx1">
-                          <a:lumMod val="50000"/>
-                          <a:lumOff val="50000"/>
-                        </a:schemeClr>
-                      </a:solidFill>
-                      <a:prstDash val="solid"/>
-                      <a:round/>
-                      <a:headEnd type="none" w="med" len="med"/>
-                      <a:tailEnd type="none" w="med" len="med"/>
-                    </a:lnR>
-                    <a:lnT w="3175" cap="flat" cmpd="sng" algn="ctr">
-                      <a:solidFill>
-                        <a:schemeClr val="tx1">
-                          <a:lumMod val="50000"/>
-                          <a:lumOff val="50000"/>
-                        </a:schemeClr>
-                      </a:solidFill>
-                      <a:prstDash val="solid"/>
-                      <a:round/>
-                      <a:headEnd type="none" w="med" len="med"/>
-                      <a:tailEnd type="none" w="med" len="med"/>
-                    </a:lnT>
-                    <a:lnB w="3175" cap="flat" cmpd="sng" algn="ctr">
-                      <a:solidFill>
-                        <a:schemeClr val="tx1">
-                          <a:lumMod val="50000"/>
-                          <a:lumOff val="50000"/>
-                        </a:schemeClr>
-                      </a:solidFill>
-                      <a:prstDash val="solid"/>
-                      <a:round/>
-                      <a:headEnd type="none" w="med" len="med"/>
-                      <a:tailEnd type="none" w="med" len="med"/>
-                    </a:lnB>
-                    <a:noFill/>
-                  </a:tcPr>
-                </a:tc>
-                <a:tc>
-                  <a:txBody>
-                    <a:bodyPr/>
-                    <a:lstStyle/>
-                    <a:p>
-                      <a:pPr algn="just" latinLnBrk="1">
-                        <a:lnSpc>
-                          <a:spcPct val="120000"/>
-                        </a:lnSpc>
-                      </a:pPr>
-                      <a:endParaRPr lang="ko-KR" altLang="en-US" sz="850" b="0" dirty="0">
-                        <a:latin typeface="+mn-ea"/>
-                        <a:ea typeface="+mn-ea"/>
-                      </a:endParaRPr>
-                    </a:p>
-                  </a:txBody>
-                  <a:tcPr anchor="ctr">
-                    <a:lnL w="3175" cap="flat" cmpd="sng" algn="ctr">
-                      <a:solidFill>
-                        <a:schemeClr val="tx1">
-                          <a:lumMod val="50000"/>
-                          <a:lumOff val="50000"/>
-                        </a:schemeClr>
-                      </a:solidFill>
-                      <a:prstDash val="solid"/>
-                      <a:round/>
-                      <a:headEnd type="none" w="med" len="med"/>
-                      <a:tailEnd type="none" w="med" len="med"/>
-                    </a:lnL>
-                    <a:lnR w="3175" cap="flat" cmpd="sng" algn="ctr">
-                      <a:noFill/>
-                      <a:prstDash val="solid"/>
-                      <a:round/>
-                      <a:headEnd type="none" w="med" len="med"/>
-                      <a:tailEnd type="none" w="med" len="med"/>
-                    </a:lnR>
-                    <a:lnT w="3175" cap="flat" cmpd="sng" algn="ctr">
-                      <a:solidFill>
-                        <a:schemeClr val="tx1">
-                          <a:lumMod val="50000"/>
-                          <a:lumOff val="50000"/>
-                        </a:schemeClr>
-                      </a:solidFill>
-                      <a:prstDash val="solid"/>
-                      <a:round/>
-                      <a:headEnd type="none" w="med" len="med"/>
-                      <a:tailEnd type="none" w="med" len="med"/>
-                    </a:lnT>
-                    <a:lnB w="3175" cap="flat" cmpd="sng" algn="ctr">
-                      <a:solidFill>
-                        <a:schemeClr val="tx1">
-                          <a:lumMod val="50000"/>
-                          <a:lumOff val="50000"/>
-                        </a:schemeClr>
-                      </a:solidFill>
-                      <a:prstDash val="solid"/>
-                      <a:round/>
-                      <a:headEnd type="none" w="med" len="med"/>
-                      <a:tailEnd type="none" w="med" len="med"/>
-                    </a:lnB>
-                    <a:noFill/>
-                  </a:tcPr>
-                </a:tc>
-                <a:extLst>
-                  <a:ext uri="{0D108BD9-81ED-4DB2-BD59-A6C34878D82A}">
-                    <a16:rowId xmlns:a16="http://schemas.microsoft.com/office/drawing/2014/main" val="1199453169"/>
-                  </a:ext>
-                </a:extLst>
-              </a:tr>
-            </a:tbl>
-          </a:graphicData>
-        </a:graphic>
-      </p:graphicFrame>
-      <p:sp>
-        <p:nvSpPr>
-          <p:cNvPr id="8" name="TextBox 7">
-            <a:extLst>
-              <a:ext uri="{FF2B5EF4-FFF2-40B4-BE49-F238E27FC236}">
-                <a16:creationId xmlns:a16="http://schemas.microsoft.com/office/drawing/2014/main" id="{DDF58C48-5157-4FFA-B714-C02B198B9885}"/>
-              </a:ext>
-            </a:extLst>
-          </p:cNvPr>
-          <p:cNvSpPr txBox="1"/>
-          <p:nvPr/>
-        </p:nvSpPr>
-        <p:spPr>
-          <a:xfrm>
-            <a:off x="11780252" y="106980"/>
-            <a:ext cx="248786" cy="230832"/>
-          </a:xfrm>
-          <a:prstGeom prst="rect">
-            <a:avLst/>
-          </a:prstGeom>
-          <a:noFill/>
-        </p:spPr>
-        <p:txBody>
-          <a:bodyPr wrap="none" rtlCol="0">
-            <a:spAutoFit/>
-          </a:bodyPr>
-          <a:lstStyle/>
-          <a:p>
-            <a:fld id="{944918D1-1C8F-48E6-92D4-4089F97E8793}" type="slidenum">
-              <a:rPr lang="ko-KR" altLang="en-US" sz="900" smtClean="0"/>
-              <a:t>9</a:t>
-            </a:fld>
-            <a:endParaRPr lang="ko-KR" altLang="en-US" sz="900" dirty="0"/>
-          </a:p>
-        </p:txBody>
-      </p:sp>
-      <p:pic>
-        <p:nvPicPr>
-          <p:cNvPr id="3" name="그림 2">
-            <a:extLst>
-              <a:ext uri="{FF2B5EF4-FFF2-40B4-BE49-F238E27FC236}">
-                <a16:creationId xmlns:a16="http://schemas.microsoft.com/office/drawing/2014/main" id="{082E1012-27A1-EAE2-81E9-FF0B37E1A6F7}"/>
-              </a:ext>
-            </a:extLst>
-          </p:cNvPr>
-          <p:cNvPicPr>
-            <a:picLocks noChangeAspect="1"/>
-          </p:cNvPicPr>
-          <p:nvPr/>
-        </p:nvPicPr>
-        <p:blipFill>
-          <a:blip r:embed="rId2">
-            <a:extLst>
-              <a:ext uri="{28A0092B-C50C-407E-A947-70E740481C1C}">
-                <a14:useLocalDpi xmlns:a14="http://schemas.microsoft.com/office/drawing/2010/main" val="0"/>
-              </a:ext>
-            </a:extLst>
-          </a:blip>
-          <a:stretch>
-            <a:fillRect/>
-          </a:stretch>
-        </p:blipFill>
-        <p:spPr>
-          <a:xfrm>
-            <a:off x="1" y="1289870"/>
-            <a:ext cx="8539361" cy="4278260"/>
-          </a:xfrm>
-          <a:prstGeom prst="rect">
-            <a:avLst/>
-          </a:prstGeom>
-        </p:spPr>
-      </p:pic>
-    </p:spTree>
-    <p:extLst>
-      <p:ext uri="{BB962C8B-B14F-4D97-AF65-F5344CB8AC3E}">
-        <p14:creationId xmlns:p14="http://schemas.microsoft.com/office/powerpoint/2010/main" val="1499549176"/>
       </p:ext>
     </p:extLst>
   </p:cSld>

</xml_diff>